<commit_message>
Corrected a few parts of the document.
</commit_message>
<xml_diff>
--- a/Documentation/DevelopAnalysis/MintTrack.pptx
+++ b/Documentation/DevelopAnalysis/MintTrack.pptx
@@ -1,8 +1,8 @@
 
 <file path=ppt/presentation.xml><?xml version="1.0" encoding="utf-8"?>
-<p:presentation xmlns:a="http://schemas.openxmlformats.org/drawingml/2006/main" xmlns:r="http://schemas.openxmlformats.org/officeDocument/2006/relationships" xmlns:p="http://schemas.openxmlformats.org/presentationml/2006/main" saveSubsetFonts="1">
+<p:presentation xmlns:a="http://schemas.openxmlformats.org/drawingml/2006/main" xmlns:r="http://schemas.openxmlformats.org/officeDocument/2006/relationships" xmlns:mc="http://schemas.openxmlformats.org/markup-compatibility/2006" xmlns:mv="urn:schemas-microsoft-com:mac:vml" xmlns:p="http://schemas.openxmlformats.org/presentationml/2006/main" mc:Ignorable="mv" mc:PreserveAttributes="mv:*" saveSubsetFonts="1">
   <p:sldMasterIdLst>
-    <p:sldMasterId id="2147483708" r:id="rId1"/>
+    <p:sldMasterId id="2147483720" r:id="rId1"/>
   </p:sldMasterIdLst>
   <p:sldIdLst>
     <p:sldId id="257" r:id="rId2"/>
@@ -122,7 +122,7 @@
 </file>
 
 <file path=ppt/slideLayouts/slideLayout1.xml><?xml version="1.0" encoding="utf-8"?>
-<p:sldLayout xmlns:a="http://schemas.openxmlformats.org/drawingml/2006/main" xmlns:r="http://schemas.openxmlformats.org/officeDocument/2006/relationships" xmlns:p="http://schemas.openxmlformats.org/presentationml/2006/main" showMasterSp="0" type="title" preserve="1">
+<p:sldLayout xmlns:a="http://schemas.openxmlformats.org/drawingml/2006/main" xmlns:r="http://schemas.openxmlformats.org/officeDocument/2006/relationships" xmlns:mc="http://schemas.openxmlformats.org/markup-compatibility/2006" xmlns:mv="urn:schemas-microsoft-com:mac:vml" xmlns:p="http://schemas.openxmlformats.org/presentationml/2006/main" mc:Ignorable="mv" mc:PreserveAttributes="mv:*" showMasterSp="0" type="title" preserve="1">
   <p:cSld name="Title Slide">
     <p:spTree>
       <p:nvGrpSpPr>
@@ -213,9 +213,7 @@
         </p:style>
         <p:txBody>
           <a:bodyPr anchor="ctr"/>
-          <a:lstStyle>
-            <a:extLst/>
-          </a:lstStyle>
+          <a:lstStyle/>
           <a:p>
             <a:pPr algn="ctr" eaLnBrk="1" latinLnBrk="0" hangingPunct="1"/>
             <a:endParaRPr kumimoji="0" lang="en-US"/>
@@ -285,9 +283,7 @@
         </p:style>
         <p:txBody>
           <a:bodyPr anchor="ctr"/>
-          <a:lstStyle>
-            <a:extLst/>
-          </a:lstStyle>
+          <a:lstStyle/>
           <a:p>
             <a:pPr algn="ctr" eaLnBrk="1" latinLnBrk="0" hangingPunct="1"/>
             <a:endParaRPr kumimoji="0" lang="en-US"/>
@@ -330,7 +326,6 @@
                 </a:effectLst>
               </a:defRPr>
             </a:lvl1pPr>
-            <a:extLst/>
           </a:lstStyle>
           <a:p>
             <a:r>
@@ -397,7 +392,6 @@
             <a:lvl9pPr marL="3657600" indent="0" algn="ctr">
               <a:buNone/>
             </a:lvl9pPr>
-            <a:extLst/>
           </a:lstStyle>
           <a:p>
             <a:r>
@@ -421,13 +415,12 @@
         <p:spPr/>
         <p:txBody>
           <a:bodyPr/>
-          <a:lstStyle>
-            <a:extLst/>
-          </a:lstStyle>
+          <a:lstStyle/>
           <a:p>
             <a:fld id="{5F01A55A-CEC5-4CE5-8B9D-108E8BEF7237}" type="datetimeFigureOut">
               <a:rPr lang="en-US" smtClean="0"/>
-              <a:t>2/20/2010</a:t>
+              <a:pPr/>
+              <a:t>2/21/10</a:t>
             </a:fld>
             <a:endParaRPr lang="en-US"/>
           </a:p>
@@ -446,9 +439,7 @@
         <p:spPr/>
         <p:txBody>
           <a:bodyPr/>
-          <a:lstStyle>
-            <a:extLst/>
-          </a:lstStyle>
+          <a:lstStyle/>
           <a:p>
             <a:endParaRPr lang="en-US"/>
           </a:p>
@@ -467,12 +458,11 @@
         <p:spPr/>
         <p:txBody>
           <a:bodyPr/>
-          <a:lstStyle>
-            <a:extLst/>
-          </a:lstStyle>
+          <a:lstStyle/>
           <a:p>
             <a:fld id="{71402A78-C0A1-4091-93B0-33F9AA7836E1}" type="slidenum">
               <a:rPr lang="en-US" smtClean="0"/>
+              <a:pPr/>
               <a:t>‹#›</a:t>
             </a:fld>
             <a:endParaRPr lang="en-US"/>
@@ -488,7 +478,7 @@
 </file>
 
 <file path=ppt/slideLayouts/slideLayout10.xml><?xml version="1.0" encoding="utf-8"?>
-<p:sldLayout xmlns:a="http://schemas.openxmlformats.org/drawingml/2006/main" xmlns:r="http://schemas.openxmlformats.org/officeDocument/2006/relationships" xmlns:p="http://schemas.openxmlformats.org/presentationml/2006/main" type="vertTx" preserve="1">
+<p:sldLayout xmlns:a="http://schemas.openxmlformats.org/drawingml/2006/main" xmlns:r="http://schemas.openxmlformats.org/officeDocument/2006/relationships" xmlns:mc="http://schemas.openxmlformats.org/markup-compatibility/2006" xmlns:mv="urn:schemas-microsoft-com:mac:vml" xmlns:p="http://schemas.openxmlformats.org/presentationml/2006/main" mc:Ignorable="mv" mc:PreserveAttributes="mv:*" type="vertTx" preserve="1">
   <p:cSld name="Title and Vertical Text">
     <p:spTree>
       <p:nvGrpSpPr>
@@ -522,9 +512,7 @@
         </p:spPr>
         <p:txBody>
           <a:bodyPr/>
-          <a:lstStyle>
-            <a:extLst/>
-          </a:lstStyle>
+          <a:lstStyle/>
           <a:p>
             <a:r>
               <a:rPr kumimoji="0" lang="en-US" smtClean="0"/>
@@ -552,9 +540,7 @@
         </p:spPr>
         <p:txBody>
           <a:bodyPr vert="eaVert"/>
-          <a:lstStyle>
-            <a:extLst/>
-          </a:lstStyle>
+          <a:lstStyle/>
           <a:p>
             <a:pPr lvl="0" eaLnBrk="1" latinLnBrk="0" hangingPunct="1"/>
             <a:r>
@@ -606,13 +592,12 @@
         <p:spPr/>
         <p:txBody>
           <a:bodyPr/>
-          <a:lstStyle>
-            <a:extLst/>
-          </a:lstStyle>
+          <a:lstStyle/>
           <a:p>
             <a:fld id="{5F01A55A-CEC5-4CE5-8B9D-108E8BEF7237}" type="datetimeFigureOut">
               <a:rPr lang="en-US" smtClean="0"/>
-              <a:t>2/20/2010</a:t>
+              <a:pPr/>
+              <a:t>2/21/10</a:t>
             </a:fld>
             <a:endParaRPr lang="en-US"/>
           </a:p>
@@ -631,9 +616,7 @@
         <p:spPr/>
         <p:txBody>
           <a:bodyPr/>
-          <a:lstStyle>
-            <a:extLst/>
-          </a:lstStyle>
+          <a:lstStyle/>
           <a:p>
             <a:endParaRPr lang="en-US"/>
           </a:p>
@@ -652,12 +635,11 @@
         <p:spPr/>
         <p:txBody>
           <a:bodyPr/>
-          <a:lstStyle>
-            <a:extLst/>
-          </a:lstStyle>
+          <a:lstStyle/>
           <a:p>
             <a:fld id="{71402A78-C0A1-4091-93B0-33F9AA7836E1}" type="slidenum">
               <a:rPr lang="en-US" smtClean="0"/>
+              <a:pPr/>
               <a:t>‹#›</a:t>
             </a:fld>
             <a:endParaRPr lang="en-US"/>
@@ -673,7 +655,7 @@
 </file>
 
 <file path=ppt/slideLayouts/slideLayout11.xml><?xml version="1.0" encoding="utf-8"?>
-<p:sldLayout xmlns:a="http://schemas.openxmlformats.org/drawingml/2006/main" xmlns:r="http://schemas.openxmlformats.org/officeDocument/2006/relationships" xmlns:p="http://schemas.openxmlformats.org/presentationml/2006/main" type="vertTitleAndTx" preserve="1">
+<p:sldLayout xmlns:a="http://schemas.openxmlformats.org/drawingml/2006/main" xmlns:r="http://schemas.openxmlformats.org/officeDocument/2006/relationships" xmlns:mc="http://schemas.openxmlformats.org/markup-compatibility/2006" xmlns:mv="urn:schemas-microsoft-com:mac:vml" xmlns:p="http://schemas.openxmlformats.org/presentationml/2006/main" mc:Ignorable="mv" mc:PreserveAttributes="mv:*" type="vertTitleAndTx" preserve="1">
   <p:cSld name="Vertical Title and Text">
     <p:spTree>
       <p:nvGrpSpPr>
@@ -707,9 +689,7 @@
         </p:spPr>
         <p:txBody>
           <a:bodyPr vert="eaVert"/>
-          <a:lstStyle>
-            <a:extLst/>
-          </a:lstStyle>
+          <a:lstStyle/>
           <a:p>
             <a:r>
               <a:rPr kumimoji="0" lang="en-US" smtClean="0"/>
@@ -737,9 +717,7 @@
         </p:spPr>
         <p:txBody>
           <a:bodyPr vert="eaVert"/>
-          <a:lstStyle>
-            <a:extLst/>
-          </a:lstStyle>
+          <a:lstStyle/>
           <a:p>
             <a:pPr lvl="0" eaLnBrk="1" latinLnBrk="0" hangingPunct="1"/>
             <a:r>
@@ -791,13 +769,12 @@
         <p:spPr/>
         <p:txBody>
           <a:bodyPr/>
-          <a:lstStyle>
-            <a:extLst/>
-          </a:lstStyle>
+          <a:lstStyle/>
           <a:p>
             <a:fld id="{5F01A55A-CEC5-4CE5-8B9D-108E8BEF7237}" type="datetimeFigureOut">
               <a:rPr lang="en-US" smtClean="0"/>
-              <a:t>2/20/2010</a:t>
+              <a:pPr/>
+              <a:t>2/21/10</a:t>
             </a:fld>
             <a:endParaRPr lang="en-US"/>
           </a:p>
@@ -816,9 +793,7 @@
         <p:spPr/>
         <p:txBody>
           <a:bodyPr/>
-          <a:lstStyle>
-            <a:extLst/>
-          </a:lstStyle>
+          <a:lstStyle/>
           <a:p>
             <a:endParaRPr lang="en-US"/>
           </a:p>
@@ -837,12 +812,11 @@
         <p:spPr/>
         <p:txBody>
           <a:bodyPr/>
-          <a:lstStyle>
-            <a:extLst/>
-          </a:lstStyle>
+          <a:lstStyle/>
           <a:p>
             <a:fld id="{71402A78-C0A1-4091-93B0-33F9AA7836E1}" type="slidenum">
               <a:rPr lang="en-US" smtClean="0"/>
+              <a:pPr/>
               <a:t>‹#›</a:t>
             </a:fld>
             <a:endParaRPr lang="en-US"/>
@@ -858,7 +832,7 @@
 </file>
 
 <file path=ppt/slideLayouts/slideLayout2.xml><?xml version="1.0" encoding="utf-8"?>
-<p:sldLayout xmlns:a="http://schemas.openxmlformats.org/drawingml/2006/main" xmlns:r="http://schemas.openxmlformats.org/officeDocument/2006/relationships" xmlns:p="http://schemas.openxmlformats.org/presentationml/2006/main" type="obj" preserve="1">
+<p:sldLayout xmlns:a="http://schemas.openxmlformats.org/drawingml/2006/main" xmlns:r="http://schemas.openxmlformats.org/officeDocument/2006/relationships" xmlns:mc="http://schemas.openxmlformats.org/markup-compatibility/2006" xmlns:mv="urn:schemas-microsoft-com:mac:vml" xmlns:p="http://schemas.openxmlformats.org/presentationml/2006/main" mc:Ignorable="mv" mc:PreserveAttributes="mv:*" type="obj" preserve="1">
   <p:cSld name="Title and Content">
     <p:spTree>
       <p:nvGrpSpPr>
@@ -892,9 +866,7 @@
         </p:spPr>
         <p:txBody>
           <a:bodyPr/>
-          <a:lstStyle>
-            <a:extLst/>
-          </a:lstStyle>
+          <a:lstStyle/>
           <a:p>
             <a:r>
               <a:rPr kumimoji="0" lang="en-US" smtClean="0"/>
@@ -922,9 +894,7 @@
         </p:spPr>
         <p:txBody>
           <a:bodyPr/>
-          <a:lstStyle>
-            <a:extLst/>
-          </a:lstStyle>
+          <a:lstStyle/>
           <a:p>
             <a:pPr lvl="0" eaLnBrk="1" latinLnBrk="0" hangingPunct="1"/>
             <a:r>
@@ -976,13 +946,12 @@
         <p:spPr/>
         <p:txBody>
           <a:bodyPr/>
-          <a:lstStyle>
-            <a:extLst/>
-          </a:lstStyle>
+          <a:lstStyle/>
           <a:p>
             <a:fld id="{5F01A55A-CEC5-4CE5-8B9D-108E8BEF7237}" type="datetimeFigureOut">
               <a:rPr lang="en-US" smtClean="0"/>
-              <a:t>2/20/2010</a:t>
+              <a:pPr/>
+              <a:t>2/21/10</a:t>
             </a:fld>
             <a:endParaRPr lang="en-US"/>
           </a:p>
@@ -1001,9 +970,7 @@
         <p:spPr/>
         <p:txBody>
           <a:bodyPr/>
-          <a:lstStyle>
-            <a:extLst/>
-          </a:lstStyle>
+          <a:lstStyle/>
           <a:p>
             <a:endParaRPr lang="en-US"/>
           </a:p>
@@ -1022,12 +989,11 @@
         <p:spPr/>
         <p:txBody>
           <a:bodyPr/>
-          <a:lstStyle>
-            <a:extLst/>
-          </a:lstStyle>
+          <a:lstStyle/>
           <a:p>
             <a:fld id="{71402A78-C0A1-4091-93B0-33F9AA7836E1}" type="slidenum">
               <a:rPr lang="en-US" smtClean="0"/>
+              <a:pPr/>
               <a:t>‹#›</a:t>
             </a:fld>
             <a:endParaRPr lang="en-US"/>
@@ -1043,7 +1009,7 @@
 </file>
 
 <file path=ppt/slideLayouts/slideLayout3.xml><?xml version="1.0" encoding="utf-8"?>
-<p:sldLayout xmlns:a="http://schemas.openxmlformats.org/drawingml/2006/main" xmlns:r="http://schemas.openxmlformats.org/officeDocument/2006/relationships" xmlns:p="http://schemas.openxmlformats.org/presentationml/2006/main" showMasterSp="0" type="secHead" preserve="1">
+<p:sldLayout xmlns:a="http://schemas.openxmlformats.org/drawingml/2006/main" xmlns:r="http://schemas.openxmlformats.org/officeDocument/2006/relationships" xmlns:mc="http://schemas.openxmlformats.org/markup-compatibility/2006" xmlns:mv="urn:schemas-microsoft-com:mac:vml" xmlns:p="http://schemas.openxmlformats.org/presentationml/2006/main" mc:Ignorable="mv" mc:PreserveAttributes="mv:*" showMasterSp="0" type="secHead" preserve="1">
   <p:cSld name="Section Header">
     <p:spTree>
       <p:nvGrpSpPr>
@@ -1134,9 +1100,7 @@
         </p:style>
         <p:txBody>
           <a:bodyPr anchor="ctr"/>
-          <a:lstStyle>
-            <a:extLst/>
-          </a:lstStyle>
+          <a:lstStyle/>
           <a:p>
             <a:pPr algn="ctr" eaLnBrk="1" latinLnBrk="0" hangingPunct="1"/>
             <a:endParaRPr kumimoji="0" lang="en-US"/>
@@ -1206,9 +1170,7 @@
         </p:style>
         <p:txBody>
           <a:bodyPr anchor="ctr"/>
-          <a:lstStyle>
-            <a:extLst/>
-          </a:lstStyle>
+          <a:lstStyle/>
           <a:p>
             <a:pPr algn="ctr" eaLnBrk="1" latinLnBrk="0" hangingPunct="1"/>
             <a:endParaRPr kumimoji="0" lang="en-US"/>
@@ -1245,7 +1207,6 @@
                 <a:effectLst/>
               </a:defRPr>
             </a:lvl1pPr>
-            <a:extLst/>
           </a:lstStyle>
           <a:p>
             <a:r>
@@ -1333,7 +1294,6 @@
                 </a:solidFill>
               </a:defRPr>
             </a:lvl5pPr>
-            <a:extLst/>
           </a:lstStyle>
           <a:p>
             <a:pPr lvl="0" eaLnBrk="1" latinLnBrk="0" hangingPunct="1"/>
@@ -1357,13 +1317,12 @@
         <p:spPr/>
         <p:txBody>
           <a:bodyPr/>
-          <a:lstStyle>
-            <a:extLst/>
-          </a:lstStyle>
+          <a:lstStyle/>
           <a:p>
             <a:fld id="{5F01A55A-CEC5-4CE5-8B9D-108E8BEF7237}" type="datetimeFigureOut">
               <a:rPr lang="en-US" smtClean="0"/>
-              <a:t>2/20/2010</a:t>
+              <a:pPr/>
+              <a:t>2/21/10</a:t>
             </a:fld>
             <a:endParaRPr lang="en-US"/>
           </a:p>
@@ -1382,9 +1341,7 @@
         <p:spPr/>
         <p:txBody>
           <a:bodyPr/>
-          <a:lstStyle>
-            <a:extLst/>
-          </a:lstStyle>
+          <a:lstStyle/>
           <a:p>
             <a:endParaRPr lang="en-US"/>
           </a:p>
@@ -1403,12 +1360,11 @@
         <p:spPr/>
         <p:txBody>
           <a:bodyPr/>
-          <a:lstStyle>
-            <a:extLst/>
-          </a:lstStyle>
+          <a:lstStyle/>
           <a:p>
             <a:fld id="{71402A78-C0A1-4091-93B0-33F9AA7836E1}" type="slidenum">
               <a:rPr lang="en-US" smtClean="0"/>
+              <a:pPr/>
               <a:t>‹#›</a:t>
             </a:fld>
             <a:endParaRPr lang="en-US"/>
@@ -1424,7 +1380,7 @@
 </file>
 
 <file path=ppt/slideLayouts/slideLayout4.xml><?xml version="1.0" encoding="utf-8"?>
-<p:sldLayout xmlns:a="http://schemas.openxmlformats.org/drawingml/2006/main" xmlns:r="http://schemas.openxmlformats.org/officeDocument/2006/relationships" xmlns:p="http://schemas.openxmlformats.org/presentationml/2006/main" type="twoObj" preserve="1">
+<p:sldLayout xmlns:a="http://schemas.openxmlformats.org/drawingml/2006/main" xmlns:r="http://schemas.openxmlformats.org/officeDocument/2006/relationships" xmlns:mc="http://schemas.openxmlformats.org/markup-compatibility/2006" xmlns:mv="urn:schemas-microsoft-com:mac:vml" xmlns:p="http://schemas.openxmlformats.org/presentationml/2006/main" mc:Ignorable="mv" mc:PreserveAttributes="mv:*" type="twoObj" preserve="1">
   <p:cSld name="Two Content">
     <p:spTree>
       <p:nvGrpSpPr>
@@ -1453,9 +1409,7 @@
         <p:spPr/>
         <p:txBody>
           <a:bodyPr/>
-          <a:lstStyle>
-            <a:extLst/>
-          </a:lstStyle>
+          <a:lstStyle/>
           <a:p>
             <a:r>
               <a:rPr kumimoji="0" lang="en-US" smtClean="0"/>
@@ -1499,7 +1453,6 @@
             <a:lvl5pPr>
               <a:defRPr sz="1800"/>
             </a:lvl5pPr>
-            <a:extLst/>
           </a:lstStyle>
           <a:p>
             <a:pPr lvl="0" eaLnBrk="1" latinLnBrk="0" hangingPunct="1"/>
@@ -1573,7 +1526,6 @@
             <a:lvl5pPr>
               <a:defRPr sz="1800"/>
             </a:lvl5pPr>
-            <a:extLst/>
           </a:lstStyle>
           <a:p>
             <a:pPr lvl="0" eaLnBrk="1" latinLnBrk="0" hangingPunct="1"/>
@@ -1626,13 +1578,12 @@
         <p:spPr/>
         <p:txBody>
           <a:bodyPr/>
-          <a:lstStyle>
-            <a:extLst/>
-          </a:lstStyle>
+          <a:lstStyle/>
           <a:p>
             <a:fld id="{5F01A55A-CEC5-4CE5-8B9D-108E8BEF7237}" type="datetimeFigureOut">
               <a:rPr lang="en-US" smtClean="0"/>
-              <a:t>2/20/2010</a:t>
+              <a:pPr/>
+              <a:t>2/21/10</a:t>
             </a:fld>
             <a:endParaRPr lang="en-US"/>
           </a:p>
@@ -1651,9 +1602,7 @@
         <p:spPr/>
         <p:txBody>
           <a:bodyPr/>
-          <a:lstStyle>
-            <a:extLst/>
-          </a:lstStyle>
+          <a:lstStyle/>
           <a:p>
             <a:endParaRPr lang="en-US"/>
           </a:p>
@@ -1672,12 +1621,11 @@
         <p:spPr/>
         <p:txBody>
           <a:bodyPr/>
-          <a:lstStyle>
-            <a:extLst/>
-          </a:lstStyle>
+          <a:lstStyle/>
           <a:p>
             <a:fld id="{71402A78-C0A1-4091-93B0-33F9AA7836E1}" type="slidenum">
               <a:rPr lang="en-US" smtClean="0"/>
+              <a:pPr/>
               <a:t>‹#›</a:t>
             </a:fld>
             <a:endParaRPr lang="en-US"/>
@@ -1693,7 +1641,7 @@
 </file>
 
 <file path=ppt/slideLayouts/slideLayout5.xml><?xml version="1.0" encoding="utf-8"?>
-<p:sldLayout xmlns:a="http://schemas.openxmlformats.org/drawingml/2006/main" xmlns:r="http://schemas.openxmlformats.org/officeDocument/2006/relationships" xmlns:p="http://schemas.openxmlformats.org/presentationml/2006/main" type="twoTxTwoObj" preserve="1">
+<p:sldLayout xmlns:a="http://schemas.openxmlformats.org/drawingml/2006/main" xmlns:r="http://schemas.openxmlformats.org/officeDocument/2006/relationships" xmlns:mc="http://schemas.openxmlformats.org/markup-compatibility/2006" xmlns:mv="urn:schemas-microsoft-com:mac:vml" xmlns:p="http://schemas.openxmlformats.org/presentationml/2006/main" mc:Ignorable="mv" mc:PreserveAttributes="mv:*" type="twoTxTwoObj" preserve="1">
   <p:cSld name="Comparison">
     <p:spTree>
       <p:nvGrpSpPr>
@@ -1731,7 +1679,6 @@
             <a:lvl1pPr>
               <a:defRPr b="1"/>
             </a:lvl1pPr>
-            <a:extLst/>
           </a:lstStyle>
           <a:p>
             <a:r>
@@ -1785,7 +1732,6 @@
               <a:buNone/>
               <a:defRPr sz="1600" b="1"/>
             </a:lvl5pPr>
-            <a:extLst/>
           </a:lstStyle>
           <a:p>
             <a:pPr lvl="0" eaLnBrk="1" latinLnBrk="0" hangingPunct="1"/>
@@ -1839,7 +1785,6 @@
               <a:buNone/>
               <a:defRPr sz="1600" b="1"/>
             </a:lvl5pPr>
-            <a:extLst/>
           </a:lstStyle>
           <a:p>
             <a:pPr lvl="0" eaLnBrk="1" latinLnBrk="0" hangingPunct="1"/>
@@ -1884,7 +1829,6 @@
             <a:lvl5pPr algn="l">
               <a:defRPr sz="1600"/>
             </a:lvl5pPr>
-            <a:extLst/>
           </a:lstStyle>
           <a:p>
             <a:pPr lvl="0" eaLnBrk="1" latinLnBrk="0" hangingPunct="1"/>
@@ -1958,7 +1902,6 @@
             <a:lvl5pPr algn="l">
               <a:defRPr sz="1600"/>
             </a:lvl5pPr>
-            <a:extLst/>
           </a:lstStyle>
           <a:p>
             <a:pPr lvl="0" eaLnBrk="1" latinLnBrk="0" hangingPunct="1"/>
@@ -2011,13 +1954,12 @@
         <p:spPr/>
         <p:txBody>
           <a:bodyPr/>
-          <a:lstStyle>
-            <a:extLst/>
-          </a:lstStyle>
+          <a:lstStyle/>
           <a:p>
             <a:fld id="{5F01A55A-CEC5-4CE5-8B9D-108E8BEF7237}" type="datetimeFigureOut">
               <a:rPr lang="en-US" smtClean="0"/>
-              <a:t>2/20/2010</a:t>
+              <a:pPr/>
+              <a:t>2/21/10</a:t>
             </a:fld>
             <a:endParaRPr lang="en-US"/>
           </a:p>
@@ -2036,9 +1978,7 @@
         <p:spPr/>
         <p:txBody>
           <a:bodyPr/>
-          <a:lstStyle>
-            <a:extLst/>
-          </a:lstStyle>
+          <a:lstStyle/>
           <a:p>
             <a:endParaRPr lang="en-US"/>
           </a:p>
@@ -2057,12 +1997,11 @@
         <p:spPr/>
         <p:txBody>
           <a:bodyPr/>
-          <a:lstStyle>
-            <a:extLst/>
-          </a:lstStyle>
+          <a:lstStyle/>
           <a:p>
             <a:fld id="{71402A78-C0A1-4091-93B0-33F9AA7836E1}" type="slidenum">
               <a:rPr lang="en-US" smtClean="0"/>
+              <a:pPr/>
               <a:t>‹#›</a:t>
             </a:fld>
             <a:endParaRPr lang="en-US"/>
@@ -2078,7 +2017,7 @@
 </file>
 
 <file path=ppt/slideLayouts/slideLayout6.xml><?xml version="1.0" encoding="utf-8"?>
-<p:sldLayout xmlns:a="http://schemas.openxmlformats.org/drawingml/2006/main" xmlns:r="http://schemas.openxmlformats.org/officeDocument/2006/relationships" xmlns:p="http://schemas.openxmlformats.org/presentationml/2006/main" type="titleOnly" preserve="1">
+<p:sldLayout xmlns:a="http://schemas.openxmlformats.org/drawingml/2006/main" xmlns:r="http://schemas.openxmlformats.org/officeDocument/2006/relationships" xmlns:mc="http://schemas.openxmlformats.org/markup-compatibility/2006" xmlns:mv="urn:schemas-microsoft-com:mac:vml" xmlns:p="http://schemas.openxmlformats.org/presentationml/2006/main" mc:Ignorable="mv" mc:PreserveAttributes="mv:*" type="titleOnly" preserve="1">
   <p:cSld name="Title Only">
     <p:spTree>
       <p:nvGrpSpPr>
@@ -2107,9 +2046,7 @@
         <p:spPr/>
         <p:txBody>
           <a:bodyPr/>
-          <a:lstStyle>
-            <a:extLst/>
-          </a:lstStyle>
+          <a:lstStyle/>
           <a:p>
             <a:r>
               <a:rPr kumimoji="0" lang="en-US" smtClean="0"/>
@@ -2132,13 +2069,12 @@
         <p:spPr/>
         <p:txBody>
           <a:bodyPr/>
-          <a:lstStyle>
-            <a:extLst/>
-          </a:lstStyle>
+          <a:lstStyle/>
           <a:p>
             <a:fld id="{5F01A55A-CEC5-4CE5-8B9D-108E8BEF7237}" type="datetimeFigureOut">
               <a:rPr lang="en-US" smtClean="0"/>
-              <a:t>2/20/2010</a:t>
+              <a:pPr/>
+              <a:t>2/21/10</a:t>
             </a:fld>
             <a:endParaRPr lang="en-US"/>
           </a:p>
@@ -2157,9 +2093,7 @@
         <p:spPr/>
         <p:txBody>
           <a:bodyPr/>
-          <a:lstStyle>
-            <a:extLst/>
-          </a:lstStyle>
+          <a:lstStyle/>
           <a:p>
             <a:endParaRPr lang="en-US"/>
           </a:p>
@@ -2178,12 +2112,11 @@
         <p:spPr/>
         <p:txBody>
           <a:bodyPr/>
-          <a:lstStyle>
-            <a:extLst/>
-          </a:lstStyle>
+          <a:lstStyle/>
           <a:p>
             <a:fld id="{71402A78-C0A1-4091-93B0-33F9AA7836E1}" type="slidenum">
               <a:rPr lang="en-US" smtClean="0"/>
+              <a:pPr/>
               <a:t>‹#›</a:t>
             </a:fld>
             <a:endParaRPr lang="en-US"/>
@@ -2199,7 +2132,7 @@
 </file>
 
 <file path=ppt/slideLayouts/slideLayout7.xml><?xml version="1.0" encoding="utf-8"?>
-<p:sldLayout xmlns:a="http://schemas.openxmlformats.org/drawingml/2006/main" xmlns:r="http://schemas.openxmlformats.org/officeDocument/2006/relationships" xmlns:p="http://schemas.openxmlformats.org/presentationml/2006/main" showMasterSp="0" type="blank" preserve="1">
+<p:sldLayout xmlns:a="http://schemas.openxmlformats.org/drawingml/2006/main" xmlns:r="http://schemas.openxmlformats.org/officeDocument/2006/relationships" xmlns:mc="http://schemas.openxmlformats.org/markup-compatibility/2006" xmlns:mv="urn:schemas-microsoft-com:mac:vml" xmlns:p="http://schemas.openxmlformats.org/presentationml/2006/main" mc:Ignorable="mv" mc:PreserveAttributes="mv:*" showMasterSp="0" type="blank" preserve="1">
   <p:cSld name="Blank">
     <p:spTree>
       <p:nvGrpSpPr>
@@ -2290,9 +2223,7 @@
         </p:style>
         <p:txBody>
           <a:bodyPr anchor="ctr"/>
-          <a:lstStyle>
-            <a:extLst/>
-          </a:lstStyle>
+          <a:lstStyle/>
           <a:p>
             <a:pPr algn="ctr" eaLnBrk="1" latinLnBrk="0" hangingPunct="1"/>
             <a:endParaRPr kumimoji="0" lang="en-US"/>
@@ -2312,13 +2243,12 @@
         <p:spPr/>
         <p:txBody>
           <a:bodyPr/>
-          <a:lstStyle>
-            <a:extLst/>
-          </a:lstStyle>
+          <a:lstStyle/>
           <a:p>
             <a:fld id="{5F01A55A-CEC5-4CE5-8B9D-108E8BEF7237}" type="datetimeFigureOut">
               <a:rPr lang="en-US" smtClean="0"/>
-              <a:t>2/20/2010</a:t>
+              <a:pPr/>
+              <a:t>2/21/10</a:t>
             </a:fld>
             <a:endParaRPr lang="en-US"/>
           </a:p>
@@ -2337,9 +2267,7 @@
         <p:spPr/>
         <p:txBody>
           <a:bodyPr/>
-          <a:lstStyle>
-            <a:extLst/>
-          </a:lstStyle>
+          <a:lstStyle/>
           <a:p>
             <a:endParaRPr lang="en-US"/>
           </a:p>
@@ -2358,12 +2286,11 @@
         <p:spPr/>
         <p:txBody>
           <a:bodyPr/>
-          <a:lstStyle>
-            <a:extLst/>
-          </a:lstStyle>
+          <a:lstStyle/>
           <a:p>
             <a:fld id="{71402A78-C0A1-4091-93B0-33F9AA7836E1}" type="slidenum">
               <a:rPr lang="en-US" smtClean="0"/>
+              <a:pPr/>
               <a:t>‹#›</a:t>
             </a:fld>
             <a:endParaRPr lang="en-US"/>
@@ -2379,7 +2306,7 @@
 </file>
 
 <file path=ppt/slideLayouts/slideLayout8.xml><?xml version="1.0" encoding="utf-8"?>
-<p:sldLayout xmlns:a="http://schemas.openxmlformats.org/drawingml/2006/main" xmlns:r="http://schemas.openxmlformats.org/officeDocument/2006/relationships" xmlns:p="http://schemas.openxmlformats.org/presentationml/2006/main" type="objTx" preserve="1">
+<p:sldLayout xmlns:a="http://schemas.openxmlformats.org/drawingml/2006/main" xmlns:r="http://schemas.openxmlformats.org/officeDocument/2006/relationships" xmlns:mc="http://schemas.openxmlformats.org/markup-compatibility/2006" xmlns:mv="urn:schemas-microsoft-com:mac:vml" xmlns:p="http://schemas.openxmlformats.org/presentationml/2006/main" mc:Ignorable="mv" mc:PreserveAttributes="mv:*" type="objTx" preserve="1">
   <p:cSld name="Content with Caption">
     <p:spTree>
       <p:nvGrpSpPr>
@@ -2422,7 +2349,6 @@
                 </a:solidFill>
               </a:defRPr>
             </a:lvl1pPr>
-            <a:extLst/>
           </a:lstStyle>
           <a:p>
             <a:r>
@@ -2495,7 +2421,6 @@
                 </a:solidFill>
               </a:defRPr>
             </a:lvl5pPr>
-            <a:extLst/>
           </a:lstStyle>
           <a:p>
             <a:pPr lvl="0" eaLnBrk="1" latinLnBrk="0" hangingPunct="1"/>
@@ -2593,7 +2518,6 @@
               <a:buNone/>
               <a:defRPr/>
             </a:lvl6pPr>
-            <a:extLst/>
           </a:lstStyle>
           <a:p>
             <a:pPr lvl="0" eaLnBrk="1" latinLnBrk="0" hangingPunct="1"/>
@@ -2646,13 +2570,12 @@
         <p:spPr/>
         <p:txBody>
           <a:bodyPr/>
-          <a:lstStyle>
-            <a:extLst/>
-          </a:lstStyle>
+          <a:lstStyle/>
           <a:p>
             <a:fld id="{5F01A55A-CEC5-4CE5-8B9D-108E8BEF7237}" type="datetimeFigureOut">
               <a:rPr lang="en-US" smtClean="0"/>
-              <a:t>2/20/2010</a:t>
+              <a:pPr/>
+              <a:t>2/21/10</a:t>
             </a:fld>
             <a:endParaRPr lang="en-US"/>
           </a:p>
@@ -2671,9 +2594,7 @@
         <p:spPr/>
         <p:txBody>
           <a:bodyPr/>
-          <a:lstStyle>
-            <a:extLst/>
-          </a:lstStyle>
+          <a:lstStyle/>
           <a:p>
             <a:endParaRPr lang="en-US"/>
           </a:p>
@@ -2692,12 +2613,11 @@
         <p:spPr/>
         <p:txBody>
           <a:bodyPr/>
-          <a:lstStyle>
-            <a:extLst/>
-          </a:lstStyle>
+          <a:lstStyle/>
           <a:p>
             <a:fld id="{71402A78-C0A1-4091-93B0-33F9AA7836E1}" type="slidenum">
               <a:rPr lang="en-US" smtClean="0"/>
+              <a:pPr/>
               <a:t>‹#›</a:t>
             </a:fld>
             <a:endParaRPr lang="en-US"/>
@@ -2713,7 +2633,7 @@
 </file>
 
 <file path=ppt/slideLayouts/slideLayout9.xml><?xml version="1.0" encoding="utf-8"?>
-<p:sldLayout xmlns:a="http://schemas.openxmlformats.org/drawingml/2006/main" xmlns:r="http://schemas.openxmlformats.org/officeDocument/2006/relationships" xmlns:p="http://schemas.openxmlformats.org/presentationml/2006/main" showMasterSp="0" type="picTx" preserve="1">
+<p:sldLayout xmlns:a="http://schemas.openxmlformats.org/drawingml/2006/main" xmlns:r="http://schemas.openxmlformats.org/officeDocument/2006/relationships" xmlns:mc="http://schemas.openxmlformats.org/markup-compatibility/2006" xmlns:mv="urn:schemas-microsoft-com:mac:vml" xmlns:p="http://schemas.openxmlformats.org/presentationml/2006/main" mc:Ignorable="mv" mc:PreserveAttributes="mv:*" showMasterSp="0" type="picTx" preserve="1">
   <p:cSld name="Picture with Caption">
     <p:spTree>
       <p:nvGrpSpPr>
@@ -2804,9 +2724,7 @@
         </p:style>
         <p:txBody>
           <a:bodyPr anchor="ctr"/>
-          <a:lstStyle>
-            <a:extLst/>
-          </a:lstStyle>
+          <a:lstStyle/>
           <a:p>
             <a:pPr algn="ctr" eaLnBrk="1" latinLnBrk="0" hangingPunct="1"/>
             <a:endParaRPr kumimoji="0" lang="en-US"/>
@@ -2854,9 +2772,7 @@
         </p:style>
         <p:txBody>
           <a:bodyPr anchor="ctr"/>
-          <a:lstStyle>
-            <a:extLst/>
-          </a:lstStyle>
+          <a:lstStyle/>
           <a:p>
             <a:pPr algn="ctr" eaLnBrk="1" latinLnBrk="0" hangingPunct="1"/>
             <a:endParaRPr kumimoji="0" lang="en-US"/>
@@ -2893,7 +2809,6 @@
                 <a:effectLst/>
               </a:defRPr>
             </a:lvl1pPr>
-            <a:extLst/>
           </a:lstStyle>
           <a:p>
             <a:r>
@@ -2962,7 +2877,6 @@
                 </a:solidFill>
               </a:defRPr>
             </a:lvl5pPr>
-            <a:extLst/>
           </a:lstStyle>
           <a:p>
             <a:pPr lvl="0" eaLnBrk="1" latinLnBrk="0" hangingPunct="1"/>
@@ -3015,13 +2929,12 @@
         <p:spPr/>
         <p:txBody>
           <a:bodyPr/>
-          <a:lstStyle>
-            <a:extLst/>
-          </a:lstStyle>
+          <a:lstStyle/>
           <a:p>
             <a:fld id="{5F01A55A-CEC5-4CE5-8B9D-108E8BEF7237}" type="datetimeFigureOut">
               <a:rPr lang="en-US" smtClean="0"/>
-              <a:t>2/20/2010</a:t>
+              <a:pPr/>
+              <a:t>2/21/10</a:t>
             </a:fld>
             <a:endParaRPr lang="en-US"/>
           </a:p>
@@ -3040,9 +2953,7 @@
         <p:spPr/>
         <p:txBody>
           <a:bodyPr/>
-          <a:lstStyle>
-            <a:extLst/>
-          </a:lstStyle>
+          <a:lstStyle/>
           <a:p>
             <a:endParaRPr lang="en-US"/>
           </a:p>
@@ -3061,12 +2972,11 @@
         <p:spPr/>
         <p:txBody>
           <a:bodyPr/>
-          <a:lstStyle>
-            <a:extLst/>
-          </a:lstStyle>
+          <a:lstStyle/>
           <a:p>
             <a:fld id="{71402A78-C0A1-4091-93B0-33F9AA7836E1}" type="slidenum">
               <a:rPr lang="en-US" smtClean="0"/>
+              <a:pPr/>
               <a:t>‹#›</a:t>
             </a:fld>
             <a:endParaRPr lang="en-US"/>
@@ -3107,7 +3017,6 @@
               <a:buNone/>
               <a:defRPr sz="3200"/>
             </a:lvl1pPr>
-            <a:extLst/>
           </a:lstStyle>
           <a:p>
             <a:r>
@@ -3127,7 +3036,7 @@
 </file>
 
 <file path=ppt/slideMasters/slideMaster1.xml><?xml version="1.0" encoding="utf-8"?>
-<p:sldMaster xmlns:a="http://schemas.openxmlformats.org/drawingml/2006/main" xmlns:r="http://schemas.openxmlformats.org/officeDocument/2006/relationships" xmlns:p="http://schemas.openxmlformats.org/presentationml/2006/main">
+<p:sldMaster xmlns:a="http://schemas.openxmlformats.org/drawingml/2006/main" xmlns:r="http://schemas.openxmlformats.org/officeDocument/2006/relationships" xmlns:mc="http://schemas.openxmlformats.org/markup-compatibility/2006" xmlns:mv="urn:schemas-microsoft-com:mac:vml" xmlns:p="http://schemas.openxmlformats.org/presentationml/2006/main" mc:Ignorable="mv" mc:PreserveAttributes="mv:*">
   <p:cSld>
     <p:bg>
       <p:bgRef idx="1001">
@@ -3223,9 +3132,7 @@
         </p:style>
         <p:txBody>
           <a:bodyPr anchor="ctr"/>
-          <a:lstStyle>
-            <a:extLst/>
-          </a:lstStyle>
+          <a:lstStyle/>
           <a:p>
             <a:pPr algn="ctr" eaLnBrk="1" latinLnBrk="0" hangingPunct="1"/>
             <a:endParaRPr kumimoji="0" lang="en-US"/>
@@ -3295,9 +3202,7 @@
         </p:style>
         <p:txBody>
           <a:bodyPr anchor="ctr"/>
-          <a:lstStyle>
-            <a:extLst/>
-          </a:lstStyle>
+          <a:lstStyle/>
           <a:p>
             <a:pPr algn="ctr" eaLnBrk="1" latinLnBrk="0" hangingPunct="1"/>
             <a:endParaRPr kumimoji="0" lang="en-US"/>
@@ -3327,9 +3232,7 @@
           <a:bodyPr vert="horz" anchor="b">
             <a:normAutofit/>
           </a:bodyPr>
-          <a:lstStyle>
-            <a:extLst/>
-          </a:lstStyle>
+          <a:lstStyle/>
           <a:p>
             <a:r>
               <a:rPr kumimoji="0" lang="en-US" smtClean="0"/>
@@ -3362,9 +3265,7 @@
           <a:bodyPr vert="horz" lIns="182880" tIns="91440">
             <a:normAutofit/>
           </a:bodyPr>
-          <a:lstStyle>
-            <a:extLst/>
-          </a:lstStyle>
+          <a:lstStyle/>
           <a:p>
             <a:pPr lvl="0" eaLnBrk="1" latinLnBrk="0" hangingPunct="1"/>
             <a:r>
@@ -3434,12 +3335,12 @@
                 </a:solidFill>
               </a:defRPr>
             </a:lvl1pPr>
-            <a:extLst/>
           </a:lstStyle>
           <a:p>
             <a:fld id="{5F01A55A-CEC5-4CE5-8B9D-108E8BEF7237}" type="datetimeFigureOut">
               <a:rPr lang="en-US" smtClean="0"/>
-              <a:t>2/20/2010</a:t>
+              <a:pPr/>
+              <a:t>2/21/10</a:t>
             </a:fld>
             <a:endParaRPr lang="en-US"/>
           </a:p>
@@ -3476,7 +3377,6 @@
                 </a:solidFill>
               </a:defRPr>
             </a:lvl1pPr>
-            <a:extLst/>
           </a:lstStyle>
           <a:p>
             <a:endParaRPr lang="en-US"/>
@@ -3514,11 +3414,11 @@
                 </a:solidFill>
               </a:defRPr>
             </a:lvl1pPr>
-            <a:extLst/>
           </a:lstStyle>
           <a:p>
             <a:fld id="{71402A78-C0A1-4091-93B0-33F9AA7836E1}" type="slidenum">
               <a:rPr lang="en-US" smtClean="0"/>
+              <a:pPr/>
               <a:t>‹#›</a:t>
             </a:fld>
             <a:endParaRPr lang="en-US"/>
@@ -3529,17 +3429,17 @@
   </p:cSld>
   <p:clrMap bg1="lt1" tx1="dk1" bg2="lt2" tx2="dk2" accent1="accent1" accent2="accent2" accent3="accent3" accent4="accent4" accent5="accent5" accent6="accent6" hlink="hlink" folHlink="folHlink"/>
   <p:sldLayoutIdLst>
-    <p:sldLayoutId id="2147483709" r:id="rId1"/>
-    <p:sldLayoutId id="2147483710" r:id="rId2"/>
-    <p:sldLayoutId id="2147483711" r:id="rId3"/>
-    <p:sldLayoutId id="2147483712" r:id="rId4"/>
-    <p:sldLayoutId id="2147483713" r:id="rId5"/>
-    <p:sldLayoutId id="2147483714" r:id="rId6"/>
-    <p:sldLayoutId id="2147483715" r:id="rId7"/>
-    <p:sldLayoutId id="2147483716" r:id="rId8"/>
-    <p:sldLayoutId id="2147483717" r:id="rId9"/>
-    <p:sldLayoutId id="2147483718" r:id="rId10"/>
-    <p:sldLayoutId id="2147483719" r:id="rId11"/>
+    <p:sldLayoutId id="2147483721" r:id="rId1"/>
+    <p:sldLayoutId id="2147483722" r:id="rId2"/>
+    <p:sldLayoutId id="2147483723" r:id="rId3"/>
+    <p:sldLayoutId id="2147483724" r:id="rId4"/>
+    <p:sldLayoutId id="2147483725" r:id="rId5"/>
+    <p:sldLayoutId id="2147483726" r:id="rId6"/>
+    <p:sldLayoutId id="2147483727" r:id="rId7"/>
+    <p:sldLayoutId id="2147483728" r:id="rId8"/>
+    <p:sldLayoutId id="2147483729" r:id="rId9"/>
+    <p:sldLayoutId id="2147483730" r:id="rId10"/>
+    <p:sldLayoutId id="2147483731" r:id="rId11"/>
   </p:sldLayoutIdLst>
   <p:txStyles>
     <p:titleStyle>
@@ -3567,7 +3467,6 @@
           <a:cs typeface="+mj-cs"/>
         </a:defRPr>
       </a:lvl1pPr>
-      <a:extLst/>
     </p:titleStyle>
     <p:bodyStyle>
       <a:lvl1pPr marL="265176" indent="-265176" algn="l" rtl="0" eaLnBrk="1" latinLnBrk="0" hangingPunct="1">
@@ -3763,7 +3662,6 @@
           <a:cs typeface="+mn-cs"/>
         </a:defRPr>
       </a:lvl9pPr>
-      <a:extLst/>
     </p:bodyStyle>
     <p:otherStyle>
       <a:lvl1pPr marL="0" algn="l" rtl="0" eaLnBrk="1" latinLnBrk="0" hangingPunct="1">
@@ -3856,14 +3754,13 @@
           <a:cs typeface="+mn-cs"/>
         </a:defRPr>
       </a:lvl9pPr>
-      <a:extLst/>
     </p:otherStyle>
   </p:txStyles>
 </p:sldMaster>
 </file>
 
 <file path=ppt/slides/slide1.xml><?xml version="1.0" encoding="utf-8"?>
-<p:sld xmlns:a="http://schemas.openxmlformats.org/drawingml/2006/main" xmlns:r="http://schemas.openxmlformats.org/officeDocument/2006/relationships" xmlns:p="http://schemas.openxmlformats.org/presentationml/2006/main">
+<p:sld xmlns:a="http://schemas.openxmlformats.org/drawingml/2006/main" xmlns:r="http://schemas.openxmlformats.org/officeDocument/2006/relationships" xmlns:mc="http://schemas.openxmlformats.org/markup-compatibility/2006" xmlns:mv="urn:schemas-microsoft-com:mac:vml" xmlns:p="http://schemas.openxmlformats.org/presentationml/2006/main" mc:Ignorable="mv" mc:PreserveAttributes="mv:*">
   <p:cSld>
     <p:spTree>
       <p:nvGrpSpPr>
@@ -3987,7 +3884,7 @@
 </file>
 
 <file path=ppt/slides/slide10.xml><?xml version="1.0" encoding="utf-8"?>
-<p:sld xmlns:a="http://schemas.openxmlformats.org/drawingml/2006/main" xmlns:r="http://schemas.openxmlformats.org/officeDocument/2006/relationships" xmlns:p="http://schemas.openxmlformats.org/presentationml/2006/main">
+<p:sld xmlns:a="http://schemas.openxmlformats.org/drawingml/2006/main" xmlns:r="http://schemas.openxmlformats.org/officeDocument/2006/relationships" xmlns:mc="http://schemas.openxmlformats.org/markup-compatibility/2006" xmlns:mv="urn:schemas-microsoft-com:mac:vml" xmlns:p="http://schemas.openxmlformats.org/presentationml/2006/main" mc:Ignorable="mv" mc:PreserveAttributes="mv:*">
   <p:cSld>
     <p:spTree>
       <p:nvGrpSpPr>
@@ -4076,7 +3973,7 @@
 </file>
 
 <file path=ppt/slides/slide11.xml><?xml version="1.0" encoding="utf-8"?>
-<p:sld xmlns:a="http://schemas.openxmlformats.org/drawingml/2006/main" xmlns:r="http://schemas.openxmlformats.org/officeDocument/2006/relationships" xmlns:p="http://schemas.openxmlformats.org/presentationml/2006/main">
+<p:sld xmlns:a="http://schemas.openxmlformats.org/drawingml/2006/main" xmlns:r="http://schemas.openxmlformats.org/officeDocument/2006/relationships" xmlns:mc="http://schemas.openxmlformats.org/markup-compatibility/2006" xmlns:mv="urn:schemas-microsoft-com:mac:vml" xmlns:p="http://schemas.openxmlformats.org/presentationml/2006/main" mc:Ignorable="mv" mc:PreserveAttributes="mv:*">
   <p:cSld>
     <p:spTree>
       <p:nvGrpSpPr>
@@ -4158,7 +4055,7 @@
 </file>
 
 <file path=ppt/slides/slide12.xml><?xml version="1.0" encoding="utf-8"?>
-<p:sld xmlns:a="http://schemas.openxmlformats.org/drawingml/2006/main" xmlns:r="http://schemas.openxmlformats.org/officeDocument/2006/relationships" xmlns:p="http://schemas.openxmlformats.org/presentationml/2006/main">
+<p:sld xmlns:a="http://schemas.openxmlformats.org/drawingml/2006/main" xmlns:r="http://schemas.openxmlformats.org/officeDocument/2006/relationships" xmlns:mc="http://schemas.openxmlformats.org/markup-compatibility/2006" xmlns:mv="urn:schemas-microsoft-com:mac:vml" xmlns:p="http://schemas.openxmlformats.org/presentationml/2006/main" mc:Ignorable="mv" mc:PreserveAttributes="mv:*">
   <p:cSld>
     <p:spTree>
       <p:nvGrpSpPr>
@@ -4247,7 +4144,7 @@
 </file>
 
 <file path=ppt/slides/slide13.xml><?xml version="1.0" encoding="utf-8"?>
-<p:sld xmlns:a="http://schemas.openxmlformats.org/drawingml/2006/main" xmlns:r="http://schemas.openxmlformats.org/officeDocument/2006/relationships" xmlns:p="http://schemas.openxmlformats.org/presentationml/2006/main">
+<p:sld xmlns:a="http://schemas.openxmlformats.org/drawingml/2006/main" xmlns:r="http://schemas.openxmlformats.org/officeDocument/2006/relationships" xmlns:mc="http://schemas.openxmlformats.org/markup-compatibility/2006" xmlns:mv="urn:schemas-microsoft-com:mac:vml" xmlns:p="http://schemas.openxmlformats.org/presentationml/2006/main" mc:Ignorable="mv" mc:PreserveAttributes="mv:*">
   <p:cSld>
     <p:spTree>
       <p:nvGrpSpPr>
@@ -4365,7 +4262,7 @@
 </file>
 
 <file path=ppt/slides/slide14.xml><?xml version="1.0" encoding="utf-8"?>
-<p:sld xmlns:a="http://schemas.openxmlformats.org/drawingml/2006/main" xmlns:r="http://schemas.openxmlformats.org/officeDocument/2006/relationships" xmlns:p="http://schemas.openxmlformats.org/presentationml/2006/main">
+<p:sld xmlns:a="http://schemas.openxmlformats.org/drawingml/2006/main" xmlns:r="http://schemas.openxmlformats.org/officeDocument/2006/relationships" xmlns:mc="http://schemas.openxmlformats.org/markup-compatibility/2006" xmlns:mv="urn:schemas-microsoft-com:mac:vml" xmlns:p="http://schemas.openxmlformats.org/presentationml/2006/main" mc:Ignorable="mv" mc:PreserveAttributes="mv:*">
   <p:cSld>
     <p:spTree>
       <p:nvGrpSpPr>
@@ -4481,7 +4378,7 @@
 </file>
 
 <file path=ppt/slides/slide15.xml><?xml version="1.0" encoding="utf-8"?>
-<p:sld xmlns:a="http://schemas.openxmlformats.org/drawingml/2006/main" xmlns:r="http://schemas.openxmlformats.org/officeDocument/2006/relationships" xmlns:p="http://schemas.openxmlformats.org/presentationml/2006/main">
+<p:sld xmlns:a="http://schemas.openxmlformats.org/drawingml/2006/main" xmlns:r="http://schemas.openxmlformats.org/officeDocument/2006/relationships" xmlns:mc="http://schemas.openxmlformats.org/markup-compatibility/2006" xmlns:mv="urn:schemas-microsoft-com:mac:vml" xmlns:p="http://schemas.openxmlformats.org/presentationml/2006/main" mc:Ignorable="mv" mc:PreserveAttributes="mv:*">
   <p:cSld>
     <p:spTree>
       <p:nvGrpSpPr>
@@ -4593,7 +4490,7 @@
 </file>
 
 <file path=ppt/slides/slide2.xml><?xml version="1.0" encoding="utf-8"?>
-<p:sld xmlns:a="http://schemas.openxmlformats.org/drawingml/2006/main" xmlns:r="http://schemas.openxmlformats.org/officeDocument/2006/relationships" xmlns:p="http://schemas.openxmlformats.org/presentationml/2006/main">
+<p:sld xmlns:a="http://schemas.openxmlformats.org/drawingml/2006/main" xmlns:r="http://schemas.openxmlformats.org/officeDocument/2006/relationships" xmlns:mc="http://schemas.openxmlformats.org/markup-compatibility/2006" xmlns:mv="urn:schemas-microsoft-com:mac:vml" xmlns:p="http://schemas.openxmlformats.org/presentationml/2006/main" mc:Ignorable="mv" mc:PreserveAttributes="mv:*">
   <p:cSld>
     <p:spTree>
       <p:nvGrpSpPr>
@@ -4616,42 +4513,37 @@
             <a:spLocks noGrp="1"/>
           </p:cNvSpPr>
           <p:nvPr>
-            <p:ph type="ctrTitle"/>
+            <p:ph type="title"/>
+          </p:nvPr>
+        </p:nvSpPr>
+        <p:spPr/>
+        <p:txBody>
+          <a:bodyPr>
+            <a:normAutofit/>
+          </a:bodyPr>
+          <a:lstStyle/>
+          <a:p>
+            <a:r>
+              <a:rPr lang="en-US" dirty="0" smtClean="0"/>
+              <a:t>User Menus</a:t>
+            </a:r>
+            <a:endParaRPr lang="en-US" dirty="0"/>
+          </a:p>
+        </p:txBody>
+      </p:sp>
+      <p:sp>
+        <p:nvSpPr>
+          <p:cNvPr id="3" name="Subtitle 2"/>
+          <p:cNvSpPr>
+            <a:spLocks noGrp="1"/>
+          </p:cNvSpPr>
+          <p:nvPr>
+            <p:ph type="subTitle" idx="4294967295"/>
           </p:nvPr>
         </p:nvSpPr>
         <p:spPr>
           <a:xfrm>
-            <a:off x="762000" y="5257800"/>
-            <a:ext cx="7772400" cy="524806"/>
-          </a:xfrm>
-        </p:spPr>
-        <p:txBody>
-          <a:bodyPr>
-            <a:normAutofit fontScale="90000"/>
-          </a:bodyPr>
-          <a:lstStyle/>
-          <a:p>
-            <a:r>
-              <a:rPr lang="en-US" dirty="0" smtClean="0"/>
-              <a:t>User Menus</a:t>
-            </a:r>
-            <a:endParaRPr lang="en-US" dirty="0"/>
-          </a:p>
-        </p:txBody>
-      </p:sp>
-      <p:sp>
-        <p:nvSpPr>
-          <p:cNvPr id="3" name="Subtitle 2"/>
-          <p:cNvSpPr>
-            <a:spLocks noGrp="1"/>
-          </p:cNvSpPr>
-          <p:nvPr>
-            <p:ph type="subTitle" idx="1"/>
-          </p:nvPr>
-        </p:nvSpPr>
-        <p:spPr>
-          <a:xfrm>
-            <a:off x="762000" y="609600"/>
+            <a:off x="609600" y="685800"/>
             <a:ext cx="7772400" cy="4267200"/>
           </a:xfrm>
         </p:spPr>
@@ -4694,22 +4586,7 @@
                   </a:outerShdw>
                 </a:effectLst>
               </a:rPr>
-              <a:t> will sport a custom 4-tab </a:t>
-            </a:r>
-            <a:r>
-              <a:rPr lang="en-US" sz="3100" dirty="0" smtClean="0">
-                <a:solidFill>
-                  <a:schemeClr val="accent1"/>
-                </a:solidFill>
-                <a:effectLst>
-                  <a:outerShdw blurRad="38100" dist="38100" dir="2700000" algn="tl">
-                    <a:srgbClr val="000000">
-                      <a:alpha val="43137"/>
-                    </a:srgbClr>
-                  </a:outerShdw>
-                </a:effectLst>
-              </a:rPr>
-              <a:t>interface</a:t>
+              <a:t> will sport a custom 4-tab interface</a:t>
             </a:r>
           </a:p>
           <a:p>
@@ -4726,15 +4603,11 @@
             </a:pPr>
             <a:r>
               <a:rPr lang="en-US" dirty="0" smtClean="0"/>
-              <a:t>Add</a:t>
-            </a:r>
-            <a:r>
-              <a:rPr lang="en-US" dirty="0" smtClean="0"/>
-              <a:t>, edit, and delete income, expense, and transfer transactions through the </a:t>
-            </a:r>
-            <a:r>
-              <a:rPr lang="en-US" dirty="0" smtClean="0"/>
-              <a:t>entry menu</a:t>
+              <a:t> Add</a:t>
+            </a:r>
+            <a:r>
+              <a:rPr lang="en-US" dirty="0" smtClean="0"/>
+              <a:t>, edit, and delete income, expense, and transfer transactions through the entry menu</a:t>
             </a:r>
           </a:p>
           <a:p>
@@ -4748,15 +4621,11 @@
             </a:pPr>
             <a:r>
               <a:rPr lang="en-US" dirty="0" smtClean="0"/>
-              <a:t>Query </a:t>
-            </a:r>
-            <a:r>
-              <a:rPr lang="en-US" dirty="0" smtClean="0"/>
-              <a:t>these transactions through the audit menu in the application</a:t>
-            </a:r>
-            <a:r>
-              <a:rPr lang="en-US" dirty="0" smtClean="0"/>
-              <a:t>.</a:t>
+              <a:t> Query </a:t>
+            </a:r>
+            <a:r>
+              <a:rPr lang="en-US" dirty="0" smtClean="0"/>
+              <a:t>these transactions through the audit menu in the application.</a:t>
             </a:r>
           </a:p>
           <a:p>
@@ -4773,15 +4642,11 @@
             </a:pPr>
             <a:r>
               <a:rPr lang="en-US" dirty="0" smtClean="0"/>
-              <a:t>View </a:t>
-            </a:r>
-            <a:r>
-              <a:rPr lang="en-US" dirty="0" smtClean="0"/>
-              <a:t>a grand total of how much money they have made or lost on the home </a:t>
-            </a:r>
-            <a:r>
-              <a:rPr lang="en-US" dirty="0" smtClean="0"/>
-              <a:t>menu</a:t>
+              <a:t> View </a:t>
+            </a:r>
+            <a:r>
+              <a:rPr lang="en-US" dirty="0" smtClean="0"/>
+              <a:t>a grand total of how much money they have made or lost on the home menu</a:t>
             </a:r>
           </a:p>
           <a:p>
@@ -4798,37 +4663,12 @@
             </a:pPr>
             <a:r>
               <a:rPr lang="en-US" dirty="0" smtClean="0"/>
-              <a:t>Use </a:t>
-            </a:r>
-            <a:r>
-              <a:rPr lang="en-US" dirty="0" smtClean="0"/>
-              <a:t>a handful of </a:t>
-            </a:r>
-            <a:r>
-              <a:rPr lang="en-US" dirty="0" smtClean="0"/>
-              <a:t>specially </a:t>
-            </a:r>
-            <a:r>
-              <a:rPr lang="en-US" dirty="0" smtClean="0"/>
-              <a:t>designed tools </a:t>
-            </a:r>
-            <a:r>
-              <a:rPr lang="en-US" dirty="0" smtClean="0"/>
-              <a:t>such as YATC </a:t>
-            </a:r>
-            <a:r>
-              <a:rPr lang="en-US" dirty="0" smtClean="0"/>
-              <a:t>(Yet Another Tip Calculator), export data, or view data as </a:t>
-            </a:r>
-            <a:r>
-              <a:rPr lang="en-US" dirty="0" smtClean="0"/>
-              <a:t>graphs in </a:t>
-            </a:r>
-            <a:r>
-              <a:rPr lang="en-US" dirty="0" smtClean="0"/>
-              <a:t>the tool menu</a:t>
-            </a:r>
-            <a:endParaRPr lang="en-US" dirty="0" smtClean="0"/>
+              <a:t> Use </a:t>
+            </a:r>
+            <a:r>
+              <a:rPr lang="en-US" dirty="0" smtClean="0"/>
+              <a:t>a handful of specially designed tools such as YATC (Yet Another Tip Calculator), export data, or view data as graphs in the tool menu</a:t>
+            </a:r>
           </a:p>
         </p:txBody>
       </p:sp>
@@ -4841,7 +4681,7 @@
 </file>
 
 <file path=ppt/slides/slide3.xml><?xml version="1.0" encoding="utf-8"?>
-<p:sld xmlns:a="http://schemas.openxmlformats.org/drawingml/2006/main" xmlns:r="http://schemas.openxmlformats.org/officeDocument/2006/relationships" xmlns:p="http://schemas.openxmlformats.org/presentationml/2006/main">
+<p:sld xmlns:a="http://schemas.openxmlformats.org/drawingml/2006/main" xmlns:r="http://schemas.openxmlformats.org/officeDocument/2006/relationships" xmlns:mc="http://schemas.openxmlformats.org/markup-compatibility/2006" xmlns:mv="urn:schemas-microsoft-com:mac:vml" xmlns:p="http://schemas.openxmlformats.org/presentationml/2006/main" mc:Ignorable="mv" mc:PreserveAttributes="mv:*">
   <p:cSld>
     <p:spTree>
       <p:nvGrpSpPr>
@@ -4890,7 +4730,22 @@
                   </a:outerShdw>
                 </a:effectLst>
               </a:rPr>
-              <a:t>Functional requirement</a:t>
+              <a:t>Functional</a:t>
+            </a:r>
+            <a:r>
+              <a:rPr lang="en-US" sz="4000" b="1" dirty="0" smtClean="0">
+                <a:solidFill>
+                  <a:schemeClr val="accent1"/>
+                </a:solidFill>
+                <a:effectLst>
+                  <a:outerShdw blurRad="38100" dist="38100" dir="2700000" algn="tl">
+                    <a:srgbClr val="000000">
+                      <a:alpha val="43137"/>
+                    </a:srgbClr>
+                  </a:outerShdw>
+                </a:effectLst>
+              </a:rPr>
+              <a:t> Requirement</a:t>
             </a:r>
             <a:r>
               <a:rPr lang="en-US" dirty="0"/>
@@ -4913,7 +4768,12 @@
             <p:ph idx="1"/>
           </p:nvPr>
         </p:nvSpPr>
-        <p:spPr/>
+        <p:spPr>
+          <a:xfrm>
+            <a:off x="502920" y="530352"/>
+            <a:ext cx="8183880" cy="4575048"/>
+          </a:xfrm>
+        </p:spPr>
         <p:txBody>
           <a:bodyPr>
             <a:normAutofit fontScale="55000" lnSpcReduction="20000"/>
@@ -4929,38 +4789,13 @@
                   <a:schemeClr val="accent1"/>
                 </a:solidFill>
               </a:rPr>
-              <a:t>Functionality </a:t>
-            </a:r>
-            <a:r>
-              <a:rPr lang="en-US" sz="4400" dirty="0" smtClean="0">
-                <a:solidFill>
-                  <a:schemeClr val="accent1"/>
-                </a:solidFill>
-              </a:rPr>
-              <a:t>for the Normal User </a:t>
-            </a:r>
-            <a:endParaRPr lang="en-US" sz="4400" dirty="0" smtClean="0">
-              <a:solidFill>
-                <a:schemeClr val="accent1"/>
-              </a:solidFill>
-            </a:endParaRPr>
-          </a:p>
-          <a:p>
-            <a:r>
-              <a:rPr lang="en-US" dirty="0" smtClean="0"/>
-              <a:t>A normal user </a:t>
-            </a:r>
-            <a:r>
-              <a:rPr lang="en-US" dirty="0" smtClean="0"/>
-              <a:t>will be able to use all the basic functionality such as </a:t>
-            </a:r>
-            <a:r>
-              <a:rPr lang="en-US" dirty="0" smtClean="0"/>
-              <a:t>enter, review, and edit income, expense, and transfer </a:t>
-            </a:r>
-            <a:r>
-              <a:rPr lang="en-US" dirty="0" smtClean="0"/>
-              <a:t>transactions</a:t>
+              <a:t>Functionality for the Normal User </a:t>
+            </a:r>
+          </a:p>
+          <a:p>
+            <a:r>
+              <a:rPr lang="en-US" dirty="0" smtClean="0"/>
+              <a:t>A normal user will be able to use all the basic functionality such as enter, review, and edit income, expense, and transfer transactions</a:t>
             </a:r>
           </a:p>
           <a:p>
@@ -4969,15 +4804,23 @@
           <a:p>
             <a:r>
               <a:rPr lang="en-US" dirty="0" smtClean="0"/>
-              <a:t>They be </a:t>
-            </a:r>
-            <a:r>
-              <a:rPr lang="en-US" dirty="0" smtClean="0"/>
-              <a:t>able to access the preferences and help menus from the bottom pop-up bar on the </a:t>
-            </a:r>
-            <a:r>
-              <a:rPr lang="en-US" dirty="0" smtClean="0"/>
-              <a:t>phone</a:t>
+              <a:t>They</a:t>
+            </a:r>
+            <a:r>
+              <a:rPr lang="en-US" dirty="0" smtClean="0"/>
+              <a:t> </a:t>
+            </a:r>
+            <a:r>
+              <a:rPr lang="en-US" dirty="0" smtClean="0"/>
+              <a:t>are expected to </a:t>
+            </a:r>
+            <a:r>
+              <a:rPr lang="en-US" dirty="0" smtClean="0"/>
+              <a:t>be </a:t>
+            </a:r>
+            <a:r>
+              <a:rPr lang="en-US" dirty="0" smtClean="0"/>
+              <a:t>able to access the preferences and help menus from the bottom pop-up bar on the phone</a:t>
             </a:r>
           </a:p>
           <a:p>
@@ -4986,18 +4829,21 @@
           <a:p>
             <a:r>
               <a:rPr lang="en-US" dirty="0" smtClean="0"/>
-              <a:t>Be </a:t>
-            </a:r>
-            <a:r>
-              <a:rPr lang="en-US" dirty="0" smtClean="0"/>
-              <a:t>able to export data and use the YATC in the tools </a:t>
-            </a:r>
-            <a:r>
-              <a:rPr lang="en-US" dirty="0" smtClean="0"/>
-              <a:t>menu</a:t>
-            </a:r>
-          </a:p>
-          <a:p>
+              <a:t>Be able to export data and use the YATC in the tools menu</a:t>
+            </a:r>
+            <a:endParaRPr lang="en-US" dirty="0" smtClean="0"/>
+          </a:p>
+          <a:p>
+            <a:pPr>
+              <a:buNone/>
+            </a:pPr>
+            <a:r>
+              <a:rPr lang="en-US" dirty="0" smtClean="0"/>
+              <a:t/>
+            </a:r>
+            <a:br>
+              <a:rPr lang="en-US" dirty="0" smtClean="0"/>
+            </a:br>
             <a:endParaRPr lang="en-US" dirty="0" smtClean="0"/>
           </a:p>
           <a:p>
@@ -5012,24 +4858,19 @@
               </a:rPr>
               <a:t>Functionality for the Advanced User </a:t>
             </a:r>
-            <a:endParaRPr lang="en-US" sz="4400" dirty="0" smtClean="0">
-              <a:solidFill>
-                <a:schemeClr val="accent1"/>
-              </a:solidFill>
-            </a:endParaRPr>
-          </a:p>
-          <a:p>
-            <a:r>
-              <a:rPr lang="en-US" dirty="0" smtClean="0"/>
-              <a:t>An advanced </a:t>
-            </a:r>
-            <a:r>
-              <a:rPr lang="en-US" dirty="0" smtClean="0"/>
-              <a:t>user will enjoy all of the same functionality the “normal </a:t>
-            </a:r>
-            <a:r>
-              <a:rPr lang="en-US" dirty="0" smtClean="0"/>
-              <a:t>user” </a:t>
+          </a:p>
+          <a:p>
+            <a:r>
+              <a:rPr lang="en-US" dirty="0" smtClean="0"/>
+              <a:t>An advanced user will enjoy all of the same functionality</a:t>
+            </a:r>
+            <a:r>
+              <a:rPr lang="en-US" dirty="0" smtClean="0"/>
+              <a:t> as the </a:t>
+            </a:r>
+            <a:r>
+              <a:rPr lang="en-US" dirty="0" smtClean="0"/>
+              <a:t>“normal user” </a:t>
             </a:r>
           </a:p>
           <a:p>
@@ -5038,15 +4879,7 @@
           <a:p>
             <a:r>
               <a:rPr lang="en-US" dirty="0" smtClean="0"/>
-              <a:t>Have </a:t>
-            </a:r>
-            <a:r>
-              <a:rPr lang="en-US" dirty="0" smtClean="0"/>
-              <a:t>the ability to create and edit accounts and categories of income and </a:t>
-            </a:r>
-            <a:r>
-              <a:rPr lang="en-US" dirty="0" smtClean="0"/>
-              <a:t>expenses</a:t>
+              <a:t>Have the ability to create and edit accounts and categories of income and expenses</a:t>
             </a:r>
           </a:p>
           <a:p>
@@ -5055,19 +4888,31 @@
           <a:p>
             <a:r>
               <a:rPr lang="en-US" dirty="0" smtClean="0"/>
-              <a:t>advanced user will find it easy to query transactions </a:t>
-            </a:r>
-            <a:r>
-              <a:rPr lang="en-US" dirty="0" smtClean="0"/>
-              <a:t>based to </a:t>
-            </a:r>
-            <a:r>
-              <a:rPr lang="en-US" dirty="0" smtClean="0"/>
-              <a:t>create an informative list of transactions </a:t>
-            </a:r>
-            <a:r>
-              <a:rPr lang="en-US" dirty="0" smtClean="0"/>
-              <a:t>or informative graphs</a:t>
+              <a:t>A</a:t>
+            </a:r>
+            <a:r>
+              <a:rPr lang="en-US" dirty="0" smtClean="0"/>
+              <a:t>dvanced users </a:t>
+            </a:r>
+            <a:r>
+              <a:rPr lang="en-US" dirty="0" smtClean="0"/>
+              <a:t>will find it easy to query transactions </a:t>
+            </a:r>
+            <a:r>
+              <a:rPr lang="en-US" dirty="0" smtClean="0"/>
+              <a:t>based on </a:t>
+            </a:r>
+            <a:r>
+              <a:rPr lang="en-US" dirty="0" smtClean="0"/>
+              <a:t>a date range, category, account, etcetera</a:t>
+            </a:r>
+            <a:r>
+              <a:rPr lang="en-US" dirty="0" smtClean="0"/>
+              <a:t> </a:t>
+            </a:r>
+            <a:r>
+              <a:rPr lang="en-US" dirty="0" smtClean="0"/>
+              <a:t>to create an informative list of transactions or informative graphs</a:t>
             </a:r>
             <a:endParaRPr lang="en-US" dirty="0"/>
           </a:p>
@@ -5082,7 +4927,7 @@
 </file>
 
 <file path=ppt/slides/slide4.xml><?xml version="1.0" encoding="utf-8"?>
-<p:sld xmlns:a="http://schemas.openxmlformats.org/drawingml/2006/main" xmlns:r="http://schemas.openxmlformats.org/officeDocument/2006/relationships" xmlns:p="http://schemas.openxmlformats.org/presentationml/2006/main">
+<p:sld xmlns:a="http://schemas.openxmlformats.org/drawingml/2006/main" xmlns:r="http://schemas.openxmlformats.org/officeDocument/2006/relationships" xmlns:mc="http://schemas.openxmlformats.org/markup-compatibility/2006" xmlns:mv="urn:schemas-microsoft-com:mac:vml" xmlns:p="http://schemas.openxmlformats.org/presentationml/2006/main" mc:Ignorable="mv" mc:PreserveAttributes="mv:*">
   <p:cSld>
     <p:spTree>
       <p:nvGrpSpPr>
@@ -5111,13 +4956,17 @@
         <p:spPr/>
         <p:txBody>
           <a:bodyPr>
-            <a:normAutofit fontScale="90000"/>
+            <a:normAutofit/>
           </a:bodyPr>
           <a:lstStyle/>
           <a:p>
             <a:r>
               <a:rPr lang="en-US" dirty="0" smtClean="0"/>
-              <a:t>Nonfunctional Requirements p1</a:t>
+              <a:t>Nonfunctional </a:t>
+            </a:r>
+            <a:r>
+              <a:rPr lang="en-US" dirty="0" smtClean="0"/>
+              <a:t>Requirements</a:t>
             </a:r>
             <a:endParaRPr lang="en-US" dirty="0"/>
           </a:p>
@@ -5133,7 +4982,12 @@
             <p:ph idx="1"/>
           </p:nvPr>
         </p:nvSpPr>
-        <p:spPr/>
+        <p:spPr>
+          <a:xfrm>
+            <a:off x="502920" y="530352"/>
+            <a:ext cx="8183880" cy="5032248"/>
+          </a:xfrm>
+        </p:spPr>
         <p:txBody>
           <a:bodyPr>
             <a:normAutofit fontScale="70000" lnSpcReduction="20000"/>
@@ -5155,11 +5009,6 @@
               </a:rPr>
               <a:t>Usability:</a:t>
             </a:r>
-            <a:endParaRPr lang="en-US" sz="3200" dirty="0" smtClean="0">
-              <a:solidFill>
-                <a:schemeClr val="accent1"/>
-              </a:solidFill>
-            </a:endParaRPr>
           </a:p>
           <a:p>
             <a:pPr>
@@ -5167,20 +5016,16 @@
             </a:pPr>
             <a:r>
               <a:rPr lang="en-US" dirty="0" smtClean="0"/>
-              <a:t>	</a:t>
-            </a:r>
-            <a:r>
-              <a:rPr lang="en-US" dirty="0" smtClean="0"/>
-              <a:t>Users </a:t>
-            </a:r>
-            <a:r>
-              <a:rPr lang="en-US" dirty="0" smtClean="0"/>
-              <a:t>must be able to navigate through tabbed menus in order to add transactions, review data, and access </a:t>
+              <a:t>	Users must be able to navigate through tabbed menus in order to add transactions, review data, and access </a:t>
             </a:r>
             <a:r>
               <a:rPr lang="en-US" dirty="0" smtClean="0"/>
               <a:t>tools</a:t>
             </a:r>
+            <a:br>
+              <a:rPr lang="en-US" dirty="0" smtClean="0"/>
+            </a:br>
+            <a:endParaRPr lang="en-US" dirty="0" smtClean="0"/>
           </a:p>
           <a:p>
             <a:pPr marL="265176" lvl="2" indent="-265176">
@@ -5222,6 +5067,9 @@
               <a:rPr lang="en-US" dirty="0" smtClean="0"/>
               <a:t>.</a:t>
             </a:r>
+            <a:br>
+              <a:rPr lang="en-US" dirty="0" smtClean="0"/>
+            </a:br>
             <a:endParaRPr lang="en-US" dirty="0" smtClean="0"/>
           </a:p>
           <a:p>
@@ -5244,13 +5092,8 @@
           <a:p>
             <a:r>
               <a:rPr lang="en-US" dirty="0" smtClean="0"/>
-              <a:t>While a user is entering or viewing data, there should be no lagging caused by the application</a:t>
-            </a:r>
-            <a:r>
-              <a:rPr lang="en-US" dirty="0" smtClean="0"/>
-              <a:t>.</a:t>
-            </a:r>
-            <a:endParaRPr lang="en-US" dirty="0" smtClean="0"/>
+              <a:t>While a user is entering or viewing data, there should be no lagging caused by the application.</a:t>
+            </a:r>
           </a:p>
           <a:p>
             <a:r>
@@ -5285,7 +5128,7 @@
 </file>
 
 <file path=ppt/slides/slide5.xml><?xml version="1.0" encoding="utf-8"?>
-<p:sld xmlns:a="http://schemas.openxmlformats.org/drawingml/2006/main" xmlns:r="http://schemas.openxmlformats.org/officeDocument/2006/relationships" xmlns:p="http://schemas.openxmlformats.org/presentationml/2006/main">
+<p:sld xmlns:a="http://schemas.openxmlformats.org/drawingml/2006/main" xmlns:r="http://schemas.openxmlformats.org/officeDocument/2006/relationships" xmlns:mc="http://schemas.openxmlformats.org/markup-compatibility/2006" xmlns:mv="urn:schemas-microsoft-com:mac:vml" xmlns:p="http://schemas.openxmlformats.org/presentationml/2006/main" mc:Ignorable="mv" mc:PreserveAttributes="mv:*">
   <p:cSld>
     <p:spTree>
       <p:nvGrpSpPr>
@@ -5311,9 +5154,16 @@
             <p:ph type="title"/>
           </p:nvPr>
         </p:nvSpPr>
-        <p:spPr/>
-        <p:txBody>
-          <a:bodyPr/>
+        <p:spPr>
+          <a:xfrm>
+            <a:off x="381000" y="4876800"/>
+            <a:ext cx="8382000" cy="1051560"/>
+          </a:xfrm>
+        </p:spPr>
+        <p:txBody>
+          <a:bodyPr>
+            <a:normAutofit fontScale="90000"/>
+          </a:bodyPr>
           <a:lstStyle/>
           <a:p>
             <a:r>
@@ -5337,7 +5187,11 @@
             </a:r>
             <a:r>
               <a:rPr lang="en-US" dirty="0" smtClean="0"/>
-              <a:t> p2</a:t>
+              <a:t> </a:t>
+            </a:r>
+            <a:r>
+              <a:rPr lang="en-US" dirty="0" smtClean="0"/>
+              <a:t>(Cont.)</a:t>
             </a:r>
             <a:endParaRPr lang="en-US" dirty="0"/>
           </a:p>
@@ -5356,12 +5210,12 @@
         <p:spPr>
           <a:xfrm>
             <a:off x="502920" y="530352"/>
-            <a:ext cx="8183880" cy="4879848"/>
+            <a:ext cx="8183880" cy="4956048"/>
           </a:xfrm>
         </p:spPr>
         <p:txBody>
           <a:bodyPr>
-            <a:normAutofit fontScale="85000" lnSpcReduction="20000"/>
+            <a:normAutofit fontScale="77500" lnSpcReduction="20000"/>
           </a:bodyPr>
           <a:lstStyle/>
           <a:p>
@@ -5391,16 +5245,16 @@
             </a:pPr>
             <a:r>
               <a:rPr lang="en-US" sz="2400" dirty="0" smtClean="0"/>
-              <a:t>	As </a:t>
-            </a:r>
-            <a:r>
-              <a:rPr lang="en-US" sz="2400" dirty="0" smtClean="0"/>
-              <a:t>of right now we do not have a plan of issuing updates to users</a:t>
+              <a:t>	As of right now we do not have a plan of issuing updates to users</a:t>
             </a:r>
             <a:r>
               <a:rPr lang="en-US" sz="2400" dirty="0" smtClean="0"/>
               <a:t>.</a:t>
             </a:r>
+            <a:br>
+              <a:rPr lang="en-US" sz="2400" dirty="0" smtClean="0"/>
+            </a:br>
+            <a:endParaRPr lang="en-US" sz="2400" dirty="0" smtClean="0"/>
           </a:p>
           <a:p>
             <a:pPr marL="265176" lvl="2" indent="-265176">
@@ -5429,16 +5283,16 @@
             </a:pPr>
             <a:r>
               <a:rPr lang="en-US" sz="2400" dirty="0" smtClean="0"/>
-              <a:t>	Any </a:t>
-            </a:r>
-            <a:r>
-              <a:rPr lang="en-US" sz="2400" dirty="0" smtClean="0"/>
-              <a:t>user who installs the application to their mobile device running an Android operating system, version 1.5 or higher, should have complete access to it at all times in which the application will be completely functional</a:t>
+              <a:t>	Any user who installs the application to their mobile device running an Android operating system, version 1.5 or higher, should have complete access to it at all times in which the application will be completely functional</a:t>
             </a:r>
             <a:r>
               <a:rPr lang="en-US" sz="2400" dirty="0" smtClean="0"/>
               <a:t>.</a:t>
             </a:r>
+            <a:br>
+              <a:rPr lang="en-US" sz="2400" dirty="0" smtClean="0"/>
+            </a:br>
+            <a:endParaRPr lang="en-US" sz="2400" dirty="0" smtClean="0"/>
           </a:p>
           <a:p>
             <a:pPr marL="265176" lvl="2" indent="-265176">
@@ -5481,6 +5335,10 @@
               <a:rPr lang="en-US" sz="2400" dirty="0" smtClean="0"/>
               <a:t>.</a:t>
             </a:r>
+            <a:br>
+              <a:rPr lang="en-US" sz="2400" dirty="0" smtClean="0"/>
+            </a:br>
+            <a:endParaRPr lang="en-US" sz="2400" dirty="0" smtClean="0"/>
           </a:p>
           <a:p>
             <a:pPr marL="265176" lvl="2" indent="-265176">
@@ -5509,11 +5367,7 @@
             </a:pPr>
             <a:r>
               <a:rPr lang="en-US" sz="2400" dirty="0" smtClean="0"/>
-              <a:t>	The </a:t>
-            </a:r>
-            <a:r>
-              <a:rPr lang="en-US" sz="2400" dirty="0" smtClean="0"/>
-              <a:t>application will be delivered through download directly to the mobile device as an APK file, where it will be installed</a:t>
+              <a:t>	The application will be delivered through download directly to the mobile device as an APK file, where it will be installed</a:t>
             </a:r>
           </a:p>
           <a:p>
@@ -5580,7 +5434,7 @@
 </file>
 
 <file path=ppt/slides/slide6.xml><?xml version="1.0" encoding="utf-8"?>
-<p:sld xmlns:a="http://schemas.openxmlformats.org/drawingml/2006/main" xmlns:r="http://schemas.openxmlformats.org/officeDocument/2006/relationships" xmlns:p="http://schemas.openxmlformats.org/presentationml/2006/main">
+<p:sld xmlns:a="http://schemas.openxmlformats.org/drawingml/2006/main" xmlns:r="http://schemas.openxmlformats.org/officeDocument/2006/relationships" xmlns:mc="http://schemas.openxmlformats.org/markup-compatibility/2006" xmlns:mv="urn:schemas-microsoft-com:mac:vml" xmlns:p="http://schemas.openxmlformats.org/presentationml/2006/main" mc:Ignorable="mv" mc:PreserveAttributes="mv:*">
   <p:cSld>
     <p:spTree>
       <p:nvGrpSpPr>
@@ -5736,7 +5590,7 @@
 </file>
 
 <file path=ppt/slides/slide7.xml><?xml version="1.0" encoding="utf-8"?>
-<p:sld xmlns:a="http://schemas.openxmlformats.org/drawingml/2006/main" xmlns:r="http://schemas.openxmlformats.org/officeDocument/2006/relationships" xmlns:p="http://schemas.openxmlformats.org/presentationml/2006/main">
+<p:sld xmlns:a="http://schemas.openxmlformats.org/drawingml/2006/main" xmlns:r="http://schemas.openxmlformats.org/officeDocument/2006/relationships" xmlns:mc="http://schemas.openxmlformats.org/markup-compatibility/2006" xmlns:mv="urn:schemas-microsoft-com:mac:vml" xmlns:p="http://schemas.openxmlformats.org/presentationml/2006/main" mc:Ignorable="mv" mc:PreserveAttributes="mv:*">
   <p:cSld>
     <p:spTree>
       <p:nvGrpSpPr>
@@ -5911,7 +5765,7 @@
 </file>
 
 <file path=ppt/slides/slide8.xml><?xml version="1.0" encoding="utf-8"?>
-<p:sld xmlns:a="http://schemas.openxmlformats.org/drawingml/2006/main" xmlns:r="http://schemas.openxmlformats.org/officeDocument/2006/relationships" xmlns:p="http://schemas.openxmlformats.org/presentationml/2006/main">
+<p:sld xmlns:a="http://schemas.openxmlformats.org/drawingml/2006/main" xmlns:r="http://schemas.openxmlformats.org/officeDocument/2006/relationships" xmlns:mc="http://schemas.openxmlformats.org/markup-compatibility/2006" xmlns:mv="urn:schemas-microsoft-com:mac:vml" xmlns:p="http://schemas.openxmlformats.org/presentationml/2006/main" mc:Ignorable="mv" mc:PreserveAttributes="mv:*">
   <p:cSld>
     <p:spTree>
       <p:nvGrpSpPr>
@@ -5966,6 +5820,39 @@
             <a:br>
               <a:rPr lang="en-US" dirty="0"/>
             </a:br>
+            <a:endParaRPr lang="en-US" dirty="0"/>
+          </a:p>
+        </p:txBody>
+      </p:sp>
+      <p:sp>
+        <p:nvSpPr>
+          <p:cNvPr id="5" name="Content Placeholder 4"/>
+          <p:cNvSpPr>
+            <a:spLocks noGrp="1"/>
+          </p:cNvSpPr>
+          <p:nvPr>
+            <p:ph idx="1"/>
+          </p:nvPr>
+        </p:nvSpPr>
+        <p:spPr>
+          <a:xfrm rot="21286768">
+            <a:off x="259881" y="764424"/>
+            <a:ext cx="3122399" cy="522593"/>
+          </a:xfrm>
+        </p:spPr>
+        <p:txBody>
+          <a:bodyPr>
+            <a:normAutofit lnSpcReduction="10000"/>
+          </a:bodyPr>
+          <a:lstStyle/>
+          <a:p>
+            <a:pPr>
+              <a:buNone/>
+            </a:pPr>
+            <a:r>
+              <a:rPr lang="en-US" dirty="0" smtClean="0"/>
+              <a:t>Use Case Model</a:t>
+            </a:r>
             <a:endParaRPr lang="en-US" dirty="0"/>
           </a:p>
         </p:txBody>
@@ -6004,39 +5891,6 @@
           </a:ln>
         </p:spPr>
       </p:pic>
-      <p:sp>
-        <p:nvSpPr>
-          <p:cNvPr id="5" name="Content Placeholder 4"/>
-          <p:cNvSpPr>
-            <a:spLocks noGrp="1"/>
-          </p:cNvSpPr>
-          <p:nvPr>
-            <p:ph idx="1"/>
-          </p:nvPr>
-        </p:nvSpPr>
-        <p:spPr>
-          <a:xfrm rot="21286768">
-            <a:off x="259881" y="764424"/>
-            <a:ext cx="3122399" cy="522593"/>
-          </a:xfrm>
-        </p:spPr>
-        <p:txBody>
-          <a:bodyPr>
-            <a:normAutofit lnSpcReduction="10000"/>
-          </a:bodyPr>
-          <a:lstStyle/>
-          <a:p>
-            <a:pPr>
-              <a:buNone/>
-            </a:pPr>
-            <a:r>
-              <a:rPr lang="en-US" dirty="0" smtClean="0"/>
-              <a:t>Use Case Model</a:t>
-            </a:r>
-            <a:endParaRPr lang="en-US" dirty="0"/>
-          </a:p>
-        </p:txBody>
-      </p:sp>
     </p:spTree>
   </p:cSld>
   <p:clrMapOvr>
@@ -6046,7 +5900,7 @@
 </file>
 
 <file path=ppt/slides/slide9.xml><?xml version="1.0" encoding="utf-8"?>
-<p:sld xmlns:a="http://schemas.openxmlformats.org/drawingml/2006/main" xmlns:r="http://schemas.openxmlformats.org/officeDocument/2006/relationships" xmlns:p="http://schemas.openxmlformats.org/presentationml/2006/main">
+<p:sld xmlns:a="http://schemas.openxmlformats.org/drawingml/2006/main" xmlns:r="http://schemas.openxmlformats.org/officeDocument/2006/relationships" xmlns:mc="http://schemas.openxmlformats.org/markup-compatibility/2006" xmlns:mv="urn:schemas-microsoft-com:mac:vml" xmlns:p="http://schemas.openxmlformats.org/presentationml/2006/main" mc:Ignorable="mv" mc:PreserveAttributes="mv:*">
   <p:cSld>
     <p:spTree>
       <p:nvGrpSpPr>
@@ -6102,7 +5956,7 @@
         </p:nvGraphicFramePr>
         <p:xfrm>
           <a:off x="793866" y="748145"/>
-          <a:ext cx="7463444" cy="4510648"/>
+          <a:ext cx="7463444" cy="4510647"/>
         </p:xfrm>
         <a:graphic>
           <a:graphicData uri="http://schemas.openxmlformats.org/drawingml/2006/table">
@@ -7162,7 +7016,50 @@
       </a:bgFillStyleLst>
     </a:fmtScheme>
   </a:themeElements>
-  <a:objectDefaults/>
+  <a:objectDefaults>
+    <a:spDef>
+      <a:spPr/>
+      <a:bodyPr rtlCol="0" anchor="ctr"/>
+      <a:lstStyle>
+        <a:defPPr algn="ctr">
+          <a:defRPr/>
+        </a:defPPr>
+      </a:lstStyle>
+      <a:style>
+        <a:lnRef idx="1">
+          <a:schemeClr val="accent1"/>
+        </a:lnRef>
+        <a:fillRef idx="3">
+          <a:schemeClr val="accent1"/>
+        </a:fillRef>
+        <a:effectRef idx="2">
+          <a:schemeClr val="accent1"/>
+        </a:effectRef>
+        <a:fontRef idx="minor">
+          <a:schemeClr val="lt1"/>
+        </a:fontRef>
+      </a:style>
+    </a:spDef>
+    <a:lnDef>
+      <a:spPr/>
+      <a:bodyPr/>
+      <a:lstStyle/>
+      <a:style>
+        <a:lnRef idx="2">
+          <a:schemeClr val="accent1"/>
+        </a:lnRef>
+        <a:fillRef idx="0">
+          <a:schemeClr val="accent1"/>
+        </a:fillRef>
+        <a:effectRef idx="1">
+          <a:schemeClr val="accent1"/>
+        </a:effectRef>
+        <a:fontRef idx="minor">
+          <a:schemeClr val="tx1"/>
+        </a:fontRef>
+      </a:style>
+    </a:lnDef>
+  </a:objectDefaults>
   <a:extraClrSchemeLst/>
 </a:theme>
 </file>
</xml_diff>

<commit_message>
Science and Engineering Day Poster Final Powerpoint Presentation
</commit_message>
<xml_diff>
--- a/Documentation/DevelopAnalysis/MintTrack.pptx
+++ b/Documentation/DevelopAnalysis/MintTrack.pptx
@@ -1,6 +1,6 @@
 
 <file path=ppt/presentation.xml><?xml version="1.0" encoding="utf-8"?>
-<p:presentation xmlns:a="http://schemas.openxmlformats.org/drawingml/2006/main" xmlns:r="http://schemas.openxmlformats.org/officeDocument/2006/relationships" xmlns:mc="http://schemas.openxmlformats.org/markup-compatibility/2006" xmlns:mv="urn:schemas-microsoft-com:mac:vml" xmlns:p="http://schemas.openxmlformats.org/presentationml/2006/main" mc:Ignorable="mv" mc:PreserveAttributes="mv:*" saveSubsetFonts="1">
+<p:presentation xmlns:a="http://schemas.openxmlformats.org/drawingml/2006/main" xmlns:r="http://schemas.openxmlformats.org/officeDocument/2006/relationships" xmlns:p="http://schemas.openxmlformats.org/presentationml/2006/main" saveSubsetFonts="1">
   <p:sldMasterIdLst>
     <p:sldMasterId id="2147483720" r:id="rId1"/>
   </p:sldMasterIdLst>
@@ -122,7 +122,7 @@
 </file>
 
 <file path=ppt/slideLayouts/slideLayout1.xml><?xml version="1.0" encoding="utf-8"?>
-<p:sldLayout xmlns:a="http://schemas.openxmlformats.org/drawingml/2006/main" xmlns:r="http://schemas.openxmlformats.org/officeDocument/2006/relationships" xmlns:mc="http://schemas.openxmlformats.org/markup-compatibility/2006" xmlns:mv="urn:schemas-microsoft-com:mac:vml" xmlns:p="http://schemas.openxmlformats.org/presentationml/2006/main" mc:Ignorable="mv" mc:PreserveAttributes="mv:*" showMasterSp="0" type="title" preserve="1">
+<p:sldLayout xmlns:a="http://schemas.openxmlformats.org/drawingml/2006/main" xmlns:r="http://schemas.openxmlformats.org/officeDocument/2006/relationships" xmlns:p="http://schemas.openxmlformats.org/presentationml/2006/main" showMasterSp="0" type="title" preserve="1">
   <p:cSld name="Title Slide">
     <p:spTree>
       <p:nvGrpSpPr>
@@ -157,22 +157,22 @@
           <a:gradFill flip="none" rotWithShape="1">
             <a:gsLst>
               <a:gs pos="0">
-                <a:srgbClr val="FFFFFF">
+                <a:srgbClr xmlns:mc="http://schemas.openxmlformats.org/markup-compatibility/2006" xmlns:a14="http://schemas.microsoft.com/office/drawing/2010/main" val="FFFFFF" mc:Ignorable="">
                   <a:shade val="100000"/>
                 </a:srgbClr>
               </a:gs>
               <a:gs pos="98000">
-                <a:srgbClr val="FFFFFF">
+                <a:srgbClr xmlns:mc="http://schemas.openxmlformats.org/markup-compatibility/2006" xmlns:a14="http://schemas.microsoft.com/office/drawing/2010/main" val="FFFFFF" mc:Ignorable="">
                   <a:shade val="100000"/>
                 </a:srgbClr>
               </a:gs>
               <a:gs pos="99055">
-                <a:srgbClr val="FFFFFF">
+                <a:srgbClr xmlns:mc="http://schemas.openxmlformats.org/markup-compatibility/2006" xmlns:a14="http://schemas.microsoft.com/office/drawing/2010/main" val="FFFFFF" mc:Ignorable="">
                   <a:shade val="93000"/>
                 </a:srgbClr>
               </a:gs>
               <a:gs pos="100000">
-                <a:srgbClr val="FFFFFF">
+                <a:srgbClr xmlns:mc="http://schemas.openxmlformats.org/markup-compatibility/2006" xmlns:a14="http://schemas.microsoft.com/office/drawing/2010/main" val="FFFFFF" mc:Ignorable="">
                   <a:shade val="70000"/>
                 </a:srgbClr>
               </a:gs>
@@ -182,7 +182,7 @@
           </a:gradFill>
           <a:ln w="2000" cap="rnd" cmpd="sng" algn="ctr">
             <a:solidFill>
-              <a:srgbClr val="302F2C">
+              <a:srgbClr xmlns:mc="http://schemas.openxmlformats.org/markup-compatibility/2006" xmlns:a14="http://schemas.microsoft.com/office/drawing/2010/main" val="302F2C" mc:Ignorable="">
                 <a:tint val="65000"/>
                 <a:satMod val="120000"/>
               </a:srgbClr>
@@ -191,7 +191,7 @@
           </a:ln>
           <a:effectLst>
             <a:outerShdw blurRad="76200" dist="50800" dir="5400000" algn="tl" rotWithShape="0">
-              <a:srgbClr val="000000">
+              <a:srgbClr xmlns:mc="http://schemas.openxmlformats.org/markup-compatibility/2006" xmlns:a14="http://schemas.microsoft.com/office/drawing/2010/main" val="000000" mc:Ignorable="">
                 <a:alpha val="25000"/>
               </a:srgbClr>
             </a:outerShdw>
@@ -319,7 +319,7 @@
                 </a:solidFill>
                 <a:effectLst>
                   <a:outerShdw blurRad="53975" dist="22860" dir="5400000" algn="tl" rotWithShape="0">
-                    <a:srgbClr val="000000">
+                    <a:srgbClr xmlns:mc="http://schemas.openxmlformats.org/markup-compatibility/2006" xmlns:a14="http://schemas.microsoft.com/office/drawing/2010/main" val="000000" mc:Ignorable="">
                       <a:alpha val="55000"/>
                     </a:srgbClr>
                   </a:outerShdw>
@@ -420,7 +420,7 @@
             <a:fld id="{5F01A55A-CEC5-4CE5-8B9D-108E8BEF7237}" type="datetimeFigureOut">
               <a:rPr lang="en-US" smtClean="0"/>
               <a:pPr/>
-              <a:t>2/21/10</a:t>
+              <a:t>2/22/2010</a:t>
             </a:fld>
             <a:endParaRPr lang="en-US"/>
           </a:p>
@@ -478,7 +478,7 @@
 </file>
 
 <file path=ppt/slideLayouts/slideLayout10.xml><?xml version="1.0" encoding="utf-8"?>
-<p:sldLayout xmlns:a="http://schemas.openxmlformats.org/drawingml/2006/main" xmlns:r="http://schemas.openxmlformats.org/officeDocument/2006/relationships" xmlns:mc="http://schemas.openxmlformats.org/markup-compatibility/2006" xmlns:mv="urn:schemas-microsoft-com:mac:vml" xmlns:p="http://schemas.openxmlformats.org/presentationml/2006/main" mc:Ignorable="mv" mc:PreserveAttributes="mv:*" type="vertTx" preserve="1">
+<p:sldLayout xmlns:a="http://schemas.openxmlformats.org/drawingml/2006/main" xmlns:r="http://schemas.openxmlformats.org/officeDocument/2006/relationships" xmlns:p="http://schemas.openxmlformats.org/presentationml/2006/main" type="vertTx" preserve="1">
   <p:cSld name="Title and Vertical Text">
     <p:spTree>
       <p:nvGrpSpPr>
@@ -597,7 +597,7 @@
             <a:fld id="{5F01A55A-CEC5-4CE5-8B9D-108E8BEF7237}" type="datetimeFigureOut">
               <a:rPr lang="en-US" smtClean="0"/>
               <a:pPr/>
-              <a:t>2/21/10</a:t>
+              <a:t>2/22/2010</a:t>
             </a:fld>
             <a:endParaRPr lang="en-US"/>
           </a:p>
@@ -655,7 +655,7 @@
 </file>
 
 <file path=ppt/slideLayouts/slideLayout11.xml><?xml version="1.0" encoding="utf-8"?>
-<p:sldLayout xmlns:a="http://schemas.openxmlformats.org/drawingml/2006/main" xmlns:r="http://schemas.openxmlformats.org/officeDocument/2006/relationships" xmlns:mc="http://schemas.openxmlformats.org/markup-compatibility/2006" xmlns:mv="urn:schemas-microsoft-com:mac:vml" xmlns:p="http://schemas.openxmlformats.org/presentationml/2006/main" mc:Ignorable="mv" mc:PreserveAttributes="mv:*" type="vertTitleAndTx" preserve="1">
+<p:sldLayout xmlns:a="http://schemas.openxmlformats.org/drawingml/2006/main" xmlns:r="http://schemas.openxmlformats.org/officeDocument/2006/relationships" xmlns:p="http://schemas.openxmlformats.org/presentationml/2006/main" type="vertTitleAndTx" preserve="1">
   <p:cSld name="Vertical Title and Text">
     <p:spTree>
       <p:nvGrpSpPr>
@@ -774,7 +774,7 @@
             <a:fld id="{5F01A55A-CEC5-4CE5-8B9D-108E8BEF7237}" type="datetimeFigureOut">
               <a:rPr lang="en-US" smtClean="0"/>
               <a:pPr/>
-              <a:t>2/21/10</a:t>
+              <a:t>2/22/2010</a:t>
             </a:fld>
             <a:endParaRPr lang="en-US"/>
           </a:p>
@@ -832,7 +832,7 @@
 </file>
 
 <file path=ppt/slideLayouts/slideLayout2.xml><?xml version="1.0" encoding="utf-8"?>
-<p:sldLayout xmlns:a="http://schemas.openxmlformats.org/drawingml/2006/main" xmlns:r="http://schemas.openxmlformats.org/officeDocument/2006/relationships" xmlns:mc="http://schemas.openxmlformats.org/markup-compatibility/2006" xmlns:mv="urn:schemas-microsoft-com:mac:vml" xmlns:p="http://schemas.openxmlformats.org/presentationml/2006/main" mc:Ignorable="mv" mc:PreserveAttributes="mv:*" type="obj" preserve="1">
+<p:sldLayout xmlns:a="http://schemas.openxmlformats.org/drawingml/2006/main" xmlns:r="http://schemas.openxmlformats.org/officeDocument/2006/relationships" xmlns:p="http://schemas.openxmlformats.org/presentationml/2006/main" type="obj" preserve="1">
   <p:cSld name="Title and Content">
     <p:spTree>
       <p:nvGrpSpPr>
@@ -951,7 +951,7 @@
             <a:fld id="{5F01A55A-CEC5-4CE5-8B9D-108E8BEF7237}" type="datetimeFigureOut">
               <a:rPr lang="en-US" smtClean="0"/>
               <a:pPr/>
-              <a:t>2/21/10</a:t>
+              <a:t>2/22/2010</a:t>
             </a:fld>
             <a:endParaRPr lang="en-US"/>
           </a:p>
@@ -1009,7 +1009,7 @@
 </file>
 
 <file path=ppt/slideLayouts/slideLayout3.xml><?xml version="1.0" encoding="utf-8"?>
-<p:sldLayout xmlns:a="http://schemas.openxmlformats.org/drawingml/2006/main" xmlns:r="http://schemas.openxmlformats.org/officeDocument/2006/relationships" xmlns:mc="http://schemas.openxmlformats.org/markup-compatibility/2006" xmlns:mv="urn:schemas-microsoft-com:mac:vml" xmlns:p="http://schemas.openxmlformats.org/presentationml/2006/main" mc:Ignorable="mv" mc:PreserveAttributes="mv:*" showMasterSp="0" type="secHead" preserve="1">
+<p:sldLayout xmlns:a="http://schemas.openxmlformats.org/drawingml/2006/main" xmlns:r="http://schemas.openxmlformats.org/officeDocument/2006/relationships" xmlns:p="http://schemas.openxmlformats.org/presentationml/2006/main" showMasterSp="0" type="secHead" preserve="1">
   <p:cSld name="Section Header">
     <p:spTree>
       <p:nvGrpSpPr>
@@ -1044,22 +1044,22 @@
           <a:gradFill flip="none" rotWithShape="1">
             <a:gsLst>
               <a:gs pos="0">
-                <a:srgbClr val="FFFFFF">
+                <a:srgbClr xmlns:mc="http://schemas.openxmlformats.org/markup-compatibility/2006" xmlns:a14="http://schemas.microsoft.com/office/drawing/2010/main" val="FFFFFF" mc:Ignorable="">
                   <a:shade val="100000"/>
                 </a:srgbClr>
               </a:gs>
               <a:gs pos="98000">
-                <a:srgbClr val="FFFFFF">
+                <a:srgbClr xmlns:mc="http://schemas.openxmlformats.org/markup-compatibility/2006" xmlns:a14="http://schemas.microsoft.com/office/drawing/2010/main" val="FFFFFF" mc:Ignorable="">
                   <a:shade val="100000"/>
                 </a:srgbClr>
               </a:gs>
               <a:gs pos="99055">
-                <a:srgbClr val="FFFFFF">
+                <a:srgbClr xmlns:mc="http://schemas.openxmlformats.org/markup-compatibility/2006" xmlns:a14="http://schemas.microsoft.com/office/drawing/2010/main" val="FFFFFF" mc:Ignorable="">
                   <a:shade val="93000"/>
                 </a:srgbClr>
               </a:gs>
               <a:gs pos="100000">
-                <a:srgbClr val="FFFFFF">
+                <a:srgbClr xmlns:mc="http://schemas.openxmlformats.org/markup-compatibility/2006" xmlns:a14="http://schemas.microsoft.com/office/drawing/2010/main" val="FFFFFF" mc:Ignorable="">
                   <a:shade val="70000"/>
                 </a:srgbClr>
               </a:gs>
@@ -1069,7 +1069,7 @@
           </a:gradFill>
           <a:ln w="2000" cap="rnd" cmpd="sng" algn="ctr">
             <a:solidFill>
-              <a:srgbClr val="302F2C">
+              <a:srgbClr xmlns:mc="http://schemas.openxmlformats.org/markup-compatibility/2006" xmlns:a14="http://schemas.microsoft.com/office/drawing/2010/main" val="302F2C" mc:Ignorable="">
                 <a:tint val="65000"/>
                 <a:satMod val="120000"/>
               </a:srgbClr>
@@ -1078,7 +1078,7 @@
           </a:ln>
           <a:effectLst>
             <a:outerShdw blurRad="76200" dist="50800" dir="5400000" algn="tl" rotWithShape="0">
-              <a:srgbClr val="000000">
+              <a:srgbClr xmlns:mc="http://schemas.openxmlformats.org/markup-compatibility/2006" xmlns:a14="http://schemas.microsoft.com/office/drawing/2010/main" val="000000" mc:Ignorable="">
                 <a:alpha val="25000"/>
               </a:srgbClr>
             </a:outerShdw>
@@ -1322,7 +1322,7 @@
             <a:fld id="{5F01A55A-CEC5-4CE5-8B9D-108E8BEF7237}" type="datetimeFigureOut">
               <a:rPr lang="en-US" smtClean="0"/>
               <a:pPr/>
-              <a:t>2/21/10</a:t>
+              <a:t>2/22/2010</a:t>
             </a:fld>
             <a:endParaRPr lang="en-US"/>
           </a:p>
@@ -1380,7 +1380,7 @@
 </file>
 
 <file path=ppt/slideLayouts/slideLayout4.xml><?xml version="1.0" encoding="utf-8"?>
-<p:sldLayout xmlns:a="http://schemas.openxmlformats.org/drawingml/2006/main" xmlns:r="http://schemas.openxmlformats.org/officeDocument/2006/relationships" xmlns:mc="http://schemas.openxmlformats.org/markup-compatibility/2006" xmlns:mv="urn:schemas-microsoft-com:mac:vml" xmlns:p="http://schemas.openxmlformats.org/presentationml/2006/main" mc:Ignorable="mv" mc:PreserveAttributes="mv:*" type="twoObj" preserve="1">
+<p:sldLayout xmlns:a="http://schemas.openxmlformats.org/drawingml/2006/main" xmlns:r="http://schemas.openxmlformats.org/officeDocument/2006/relationships" xmlns:p="http://schemas.openxmlformats.org/presentationml/2006/main" type="twoObj" preserve="1">
   <p:cSld name="Two Content">
     <p:spTree>
       <p:nvGrpSpPr>
@@ -1583,7 +1583,7 @@
             <a:fld id="{5F01A55A-CEC5-4CE5-8B9D-108E8BEF7237}" type="datetimeFigureOut">
               <a:rPr lang="en-US" smtClean="0"/>
               <a:pPr/>
-              <a:t>2/21/10</a:t>
+              <a:t>2/22/2010</a:t>
             </a:fld>
             <a:endParaRPr lang="en-US"/>
           </a:p>
@@ -1641,7 +1641,7 @@
 </file>
 
 <file path=ppt/slideLayouts/slideLayout5.xml><?xml version="1.0" encoding="utf-8"?>
-<p:sldLayout xmlns:a="http://schemas.openxmlformats.org/drawingml/2006/main" xmlns:r="http://schemas.openxmlformats.org/officeDocument/2006/relationships" xmlns:mc="http://schemas.openxmlformats.org/markup-compatibility/2006" xmlns:mv="urn:schemas-microsoft-com:mac:vml" xmlns:p="http://schemas.openxmlformats.org/presentationml/2006/main" mc:Ignorable="mv" mc:PreserveAttributes="mv:*" type="twoTxTwoObj" preserve="1">
+<p:sldLayout xmlns:a="http://schemas.openxmlformats.org/drawingml/2006/main" xmlns:r="http://schemas.openxmlformats.org/officeDocument/2006/relationships" xmlns:p="http://schemas.openxmlformats.org/presentationml/2006/main" type="twoTxTwoObj" preserve="1">
   <p:cSld name="Comparison">
     <p:spTree>
       <p:nvGrpSpPr>
@@ -1959,7 +1959,7 @@
             <a:fld id="{5F01A55A-CEC5-4CE5-8B9D-108E8BEF7237}" type="datetimeFigureOut">
               <a:rPr lang="en-US" smtClean="0"/>
               <a:pPr/>
-              <a:t>2/21/10</a:t>
+              <a:t>2/22/2010</a:t>
             </a:fld>
             <a:endParaRPr lang="en-US"/>
           </a:p>
@@ -2017,7 +2017,7 @@
 </file>
 
 <file path=ppt/slideLayouts/slideLayout6.xml><?xml version="1.0" encoding="utf-8"?>
-<p:sldLayout xmlns:a="http://schemas.openxmlformats.org/drawingml/2006/main" xmlns:r="http://schemas.openxmlformats.org/officeDocument/2006/relationships" xmlns:mc="http://schemas.openxmlformats.org/markup-compatibility/2006" xmlns:mv="urn:schemas-microsoft-com:mac:vml" xmlns:p="http://schemas.openxmlformats.org/presentationml/2006/main" mc:Ignorable="mv" mc:PreserveAttributes="mv:*" type="titleOnly" preserve="1">
+<p:sldLayout xmlns:a="http://schemas.openxmlformats.org/drawingml/2006/main" xmlns:r="http://schemas.openxmlformats.org/officeDocument/2006/relationships" xmlns:p="http://schemas.openxmlformats.org/presentationml/2006/main" type="titleOnly" preserve="1">
   <p:cSld name="Title Only">
     <p:spTree>
       <p:nvGrpSpPr>
@@ -2074,7 +2074,7 @@
             <a:fld id="{5F01A55A-CEC5-4CE5-8B9D-108E8BEF7237}" type="datetimeFigureOut">
               <a:rPr lang="en-US" smtClean="0"/>
               <a:pPr/>
-              <a:t>2/21/10</a:t>
+              <a:t>2/22/2010</a:t>
             </a:fld>
             <a:endParaRPr lang="en-US"/>
           </a:p>
@@ -2132,7 +2132,7 @@
 </file>
 
 <file path=ppt/slideLayouts/slideLayout7.xml><?xml version="1.0" encoding="utf-8"?>
-<p:sldLayout xmlns:a="http://schemas.openxmlformats.org/drawingml/2006/main" xmlns:r="http://schemas.openxmlformats.org/officeDocument/2006/relationships" xmlns:mc="http://schemas.openxmlformats.org/markup-compatibility/2006" xmlns:mv="urn:schemas-microsoft-com:mac:vml" xmlns:p="http://schemas.openxmlformats.org/presentationml/2006/main" mc:Ignorable="mv" mc:PreserveAttributes="mv:*" showMasterSp="0" type="blank" preserve="1">
+<p:sldLayout xmlns:a="http://schemas.openxmlformats.org/drawingml/2006/main" xmlns:r="http://schemas.openxmlformats.org/officeDocument/2006/relationships" xmlns:p="http://schemas.openxmlformats.org/presentationml/2006/main" showMasterSp="0" type="blank" preserve="1">
   <p:cSld name="Blank">
     <p:spTree>
       <p:nvGrpSpPr>
@@ -2167,22 +2167,22 @@
           <a:gradFill flip="none" rotWithShape="1">
             <a:gsLst>
               <a:gs pos="0">
-                <a:srgbClr val="FFFFFF">
+                <a:srgbClr xmlns:mc="http://schemas.openxmlformats.org/markup-compatibility/2006" xmlns:a14="http://schemas.microsoft.com/office/drawing/2010/main" val="FFFFFF" mc:Ignorable="">
                   <a:shade val="100000"/>
                 </a:srgbClr>
               </a:gs>
               <a:gs pos="98000">
-                <a:srgbClr val="FFFFFF">
+                <a:srgbClr xmlns:mc="http://schemas.openxmlformats.org/markup-compatibility/2006" xmlns:a14="http://schemas.microsoft.com/office/drawing/2010/main" val="FFFFFF" mc:Ignorable="">
                   <a:shade val="100000"/>
                 </a:srgbClr>
               </a:gs>
               <a:gs pos="99055">
-                <a:srgbClr val="FFFFFF">
+                <a:srgbClr xmlns:mc="http://schemas.openxmlformats.org/markup-compatibility/2006" xmlns:a14="http://schemas.microsoft.com/office/drawing/2010/main" val="FFFFFF" mc:Ignorable="">
                   <a:shade val="93000"/>
                 </a:srgbClr>
               </a:gs>
               <a:gs pos="100000">
-                <a:srgbClr val="FFFFFF">
+                <a:srgbClr xmlns:mc="http://schemas.openxmlformats.org/markup-compatibility/2006" xmlns:a14="http://schemas.microsoft.com/office/drawing/2010/main" val="FFFFFF" mc:Ignorable="">
                   <a:shade val="70000"/>
                 </a:srgbClr>
               </a:gs>
@@ -2192,7 +2192,7 @@
           </a:gradFill>
           <a:ln w="2000" cap="rnd" cmpd="sng" algn="ctr">
             <a:solidFill>
-              <a:srgbClr val="302F2C">
+              <a:srgbClr xmlns:mc="http://schemas.openxmlformats.org/markup-compatibility/2006" xmlns:a14="http://schemas.microsoft.com/office/drawing/2010/main" val="302F2C" mc:Ignorable="">
                 <a:tint val="65000"/>
                 <a:satMod val="120000"/>
               </a:srgbClr>
@@ -2201,7 +2201,7 @@
           </a:ln>
           <a:effectLst>
             <a:outerShdw blurRad="76200" dist="50800" dir="5400000" algn="tl" rotWithShape="0">
-              <a:srgbClr val="000000">
+              <a:srgbClr xmlns:mc="http://schemas.openxmlformats.org/markup-compatibility/2006" xmlns:a14="http://schemas.microsoft.com/office/drawing/2010/main" val="000000" mc:Ignorable="">
                 <a:alpha val="25000"/>
               </a:srgbClr>
             </a:outerShdw>
@@ -2248,7 +2248,7 @@
             <a:fld id="{5F01A55A-CEC5-4CE5-8B9D-108E8BEF7237}" type="datetimeFigureOut">
               <a:rPr lang="en-US" smtClean="0"/>
               <a:pPr/>
-              <a:t>2/21/10</a:t>
+              <a:t>2/22/2010</a:t>
             </a:fld>
             <a:endParaRPr lang="en-US"/>
           </a:p>
@@ -2306,7 +2306,7 @@
 </file>
 
 <file path=ppt/slideLayouts/slideLayout8.xml><?xml version="1.0" encoding="utf-8"?>
-<p:sldLayout xmlns:a="http://schemas.openxmlformats.org/drawingml/2006/main" xmlns:r="http://schemas.openxmlformats.org/officeDocument/2006/relationships" xmlns:mc="http://schemas.openxmlformats.org/markup-compatibility/2006" xmlns:mv="urn:schemas-microsoft-com:mac:vml" xmlns:p="http://schemas.openxmlformats.org/presentationml/2006/main" mc:Ignorable="mv" mc:PreserveAttributes="mv:*" type="objTx" preserve="1">
+<p:sldLayout xmlns:a="http://schemas.openxmlformats.org/drawingml/2006/main" xmlns:r="http://schemas.openxmlformats.org/officeDocument/2006/relationships" xmlns:p="http://schemas.openxmlformats.org/presentationml/2006/main" type="objTx" preserve="1">
   <p:cSld name="Content with Caption">
     <p:spTree>
       <p:nvGrpSpPr>
@@ -2575,7 +2575,7 @@
             <a:fld id="{5F01A55A-CEC5-4CE5-8B9D-108E8BEF7237}" type="datetimeFigureOut">
               <a:rPr lang="en-US" smtClean="0"/>
               <a:pPr/>
-              <a:t>2/21/10</a:t>
+              <a:t>2/22/2010</a:t>
             </a:fld>
             <a:endParaRPr lang="en-US"/>
           </a:p>
@@ -2633,7 +2633,7 @@
 </file>
 
 <file path=ppt/slideLayouts/slideLayout9.xml><?xml version="1.0" encoding="utf-8"?>
-<p:sldLayout xmlns:a="http://schemas.openxmlformats.org/drawingml/2006/main" xmlns:r="http://schemas.openxmlformats.org/officeDocument/2006/relationships" xmlns:mc="http://schemas.openxmlformats.org/markup-compatibility/2006" xmlns:mv="urn:schemas-microsoft-com:mac:vml" xmlns:p="http://schemas.openxmlformats.org/presentationml/2006/main" mc:Ignorable="mv" mc:PreserveAttributes="mv:*" showMasterSp="0" type="picTx" preserve="1">
+<p:sldLayout xmlns:a="http://schemas.openxmlformats.org/drawingml/2006/main" xmlns:r="http://schemas.openxmlformats.org/officeDocument/2006/relationships" xmlns:p="http://schemas.openxmlformats.org/presentationml/2006/main" showMasterSp="0" type="picTx" preserve="1">
   <p:cSld name="Picture with Caption">
     <p:spTree>
       <p:nvGrpSpPr>
@@ -2668,22 +2668,22 @@
           <a:gradFill flip="none" rotWithShape="1">
             <a:gsLst>
               <a:gs pos="0">
-                <a:srgbClr val="FFFFFF">
+                <a:srgbClr xmlns:mc="http://schemas.openxmlformats.org/markup-compatibility/2006" xmlns:a14="http://schemas.microsoft.com/office/drawing/2010/main" val="FFFFFF" mc:Ignorable="">
                   <a:shade val="100000"/>
                 </a:srgbClr>
               </a:gs>
               <a:gs pos="98000">
-                <a:srgbClr val="FFFFFF">
+                <a:srgbClr xmlns:mc="http://schemas.openxmlformats.org/markup-compatibility/2006" xmlns:a14="http://schemas.microsoft.com/office/drawing/2010/main" val="FFFFFF" mc:Ignorable="">
                   <a:shade val="100000"/>
                 </a:srgbClr>
               </a:gs>
               <a:gs pos="99055">
-                <a:srgbClr val="FFFFFF">
+                <a:srgbClr xmlns:mc="http://schemas.openxmlformats.org/markup-compatibility/2006" xmlns:a14="http://schemas.microsoft.com/office/drawing/2010/main" val="FFFFFF" mc:Ignorable="">
                   <a:shade val="93000"/>
                 </a:srgbClr>
               </a:gs>
               <a:gs pos="100000">
-                <a:srgbClr val="FFFFFF">
+                <a:srgbClr xmlns:mc="http://schemas.openxmlformats.org/markup-compatibility/2006" xmlns:a14="http://schemas.microsoft.com/office/drawing/2010/main" val="FFFFFF" mc:Ignorable="">
                   <a:shade val="70000"/>
                 </a:srgbClr>
               </a:gs>
@@ -2693,7 +2693,7 @@
           </a:gradFill>
           <a:ln w="2000" cap="rnd" cmpd="sng" algn="ctr">
             <a:solidFill>
-              <a:srgbClr val="302F2C">
+              <a:srgbClr xmlns:mc="http://schemas.openxmlformats.org/markup-compatibility/2006" xmlns:a14="http://schemas.microsoft.com/office/drawing/2010/main" val="302F2C" mc:Ignorable="">
                 <a:tint val="65000"/>
                 <a:satMod val="120000"/>
               </a:srgbClr>
@@ -2702,7 +2702,7 @@
           </a:ln>
           <a:effectLst>
             <a:outerShdw blurRad="76200" dist="50800" dir="5400000" algn="tl" rotWithShape="0">
-              <a:srgbClr val="000000">
+              <a:srgbClr xmlns:mc="http://schemas.openxmlformats.org/markup-compatibility/2006" xmlns:a14="http://schemas.microsoft.com/office/drawing/2010/main" val="000000" mc:Ignorable="">
                 <a:alpha val="25000"/>
               </a:srgbClr>
             </a:outerShdw>
@@ -2748,7 +2748,7 @@
             </a:avLst>
           </a:prstGeom>
           <a:solidFill>
-            <a:srgbClr val="1C1C1C"/>
+            <a:srgbClr xmlns:mc="http://schemas.openxmlformats.org/markup-compatibility/2006" xmlns:a14="http://schemas.microsoft.com/office/drawing/2010/main" val="1C1C1C" mc:Ignorable=""/>
           </a:solidFill>
           <a:ln w="8890" cap="rnd" cmpd="sng" algn="ctr">
             <a:noFill/>
@@ -2845,35 +2845,35 @@
               <a:buNone/>
               <a:defRPr sz="1400">
                 <a:solidFill>
-                  <a:srgbClr val="FFFFFF"/>
+                  <a:srgbClr xmlns:mc="http://schemas.openxmlformats.org/markup-compatibility/2006" xmlns:a14="http://schemas.microsoft.com/office/drawing/2010/main" val="FFFFFF" mc:Ignorable=""/>
                 </a:solidFill>
               </a:defRPr>
             </a:lvl1pPr>
             <a:lvl2pPr>
               <a:defRPr sz="1200">
                 <a:solidFill>
-                  <a:srgbClr val="FFFFFF"/>
+                  <a:srgbClr xmlns:mc="http://schemas.openxmlformats.org/markup-compatibility/2006" xmlns:a14="http://schemas.microsoft.com/office/drawing/2010/main" val="FFFFFF" mc:Ignorable=""/>
                 </a:solidFill>
               </a:defRPr>
             </a:lvl2pPr>
             <a:lvl3pPr>
               <a:defRPr sz="1000">
                 <a:solidFill>
-                  <a:srgbClr val="FFFFFF"/>
+                  <a:srgbClr xmlns:mc="http://schemas.openxmlformats.org/markup-compatibility/2006" xmlns:a14="http://schemas.microsoft.com/office/drawing/2010/main" val="FFFFFF" mc:Ignorable=""/>
                 </a:solidFill>
               </a:defRPr>
             </a:lvl3pPr>
             <a:lvl4pPr>
               <a:defRPr sz="900">
                 <a:solidFill>
-                  <a:srgbClr val="FFFFFF"/>
+                  <a:srgbClr xmlns:mc="http://schemas.openxmlformats.org/markup-compatibility/2006" xmlns:a14="http://schemas.microsoft.com/office/drawing/2010/main" val="FFFFFF" mc:Ignorable=""/>
                 </a:solidFill>
               </a:defRPr>
             </a:lvl4pPr>
             <a:lvl5pPr>
               <a:defRPr sz="900">
                 <a:solidFill>
-                  <a:srgbClr val="FFFFFF"/>
+                  <a:srgbClr xmlns:mc="http://schemas.openxmlformats.org/markup-compatibility/2006" xmlns:a14="http://schemas.microsoft.com/office/drawing/2010/main" val="FFFFFF" mc:Ignorable=""/>
                 </a:solidFill>
               </a:defRPr>
             </a:lvl5pPr>
@@ -2934,7 +2934,7 @@
             <a:fld id="{5F01A55A-CEC5-4CE5-8B9D-108E8BEF7237}" type="datetimeFigureOut">
               <a:rPr lang="en-US" smtClean="0"/>
               <a:pPr/>
-              <a:t>2/21/10</a:t>
+              <a:t>2/22/2010</a:t>
             </a:fld>
             <a:endParaRPr lang="en-US"/>
           </a:p>
@@ -3036,7 +3036,7 @@
 </file>
 
 <file path=ppt/slideMasters/slideMaster1.xml><?xml version="1.0" encoding="utf-8"?>
-<p:sldMaster xmlns:a="http://schemas.openxmlformats.org/drawingml/2006/main" xmlns:r="http://schemas.openxmlformats.org/officeDocument/2006/relationships" xmlns:mc="http://schemas.openxmlformats.org/markup-compatibility/2006" xmlns:mv="urn:schemas-microsoft-com:mac:vml" xmlns:p="http://schemas.openxmlformats.org/presentationml/2006/main" mc:Ignorable="mv" mc:PreserveAttributes="mv:*">
+<p:sldMaster xmlns:a="http://schemas.openxmlformats.org/drawingml/2006/main" xmlns:r="http://schemas.openxmlformats.org/officeDocument/2006/relationships" xmlns:p="http://schemas.openxmlformats.org/presentationml/2006/main">
   <p:cSld>
     <p:bg>
       <p:bgRef idx="1001">
@@ -3076,22 +3076,22 @@
           <a:gradFill flip="none" rotWithShape="1">
             <a:gsLst>
               <a:gs pos="0">
-                <a:srgbClr val="FFFFFF">
+                <a:srgbClr xmlns:mc="http://schemas.openxmlformats.org/markup-compatibility/2006" xmlns:a14="http://schemas.microsoft.com/office/drawing/2010/main" val="FFFFFF" mc:Ignorable="">
                   <a:shade val="100000"/>
                 </a:srgbClr>
               </a:gs>
               <a:gs pos="98000">
-                <a:srgbClr val="FFFFFF">
+                <a:srgbClr xmlns:mc="http://schemas.openxmlformats.org/markup-compatibility/2006" xmlns:a14="http://schemas.microsoft.com/office/drawing/2010/main" val="FFFFFF" mc:Ignorable="">
                   <a:shade val="100000"/>
                 </a:srgbClr>
               </a:gs>
               <a:gs pos="99055">
-                <a:srgbClr val="FFFFFF">
+                <a:srgbClr xmlns:mc="http://schemas.openxmlformats.org/markup-compatibility/2006" xmlns:a14="http://schemas.microsoft.com/office/drawing/2010/main" val="FFFFFF" mc:Ignorable="">
                   <a:shade val="93000"/>
                 </a:srgbClr>
               </a:gs>
               <a:gs pos="100000">
-                <a:srgbClr val="FFFFFF">
+                <a:srgbClr xmlns:mc="http://schemas.openxmlformats.org/markup-compatibility/2006" xmlns:a14="http://schemas.microsoft.com/office/drawing/2010/main" val="FFFFFF" mc:Ignorable="">
                   <a:shade val="70000"/>
                 </a:srgbClr>
               </a:gs>
@@ -3101,7 +3101,7 @@
           </a:gradFill>
           <a:ln w="2000" cap="rnd" cmpd="sng" algn="ctr">
             <a:solidFill>
-              <a:srgbClr val="302F2C">
+              <a:srgbClr xmlns:mc="http://schemas.openxmlformats.org/markup-compatibility/2006" xmlns:a14="http://schemas.microsoft.com/office/drawing/2010/main" val="302F2C" mc:Ignorable="">
                 <a:tint val="65000"/>
                 <a:satMod val="120000"/>
               </a:srgbClr>
@@ -3110,7 +3110,7 @@
           </a:ln>
           <a:effectLst>
             <a:outerShdw blurRad="76200" dist="50800" dir="5400000" algn="tl" rotWithShape="0">
-              <a:srgbClr val="000000">
+              <a:srgbClr xmlns:mc="http://schemas.openxmlformats.org/markup-compatibility/2006" xmlns:a14="http://schemas.microsoft.com/office/drawing/2010/main" val="000000" mc:Ignorable="">
                 <a:alpha val="25000"/>
               </a:srgbClr>
             </a:outerShdw>
@@ -3340,7 +3340,7 @@
             <a:fld id="{5F01A55A-CEC5-4CE5-8B9D-108E8BEF7237}" type="datetimeFigureOut">
               <a:rPr lang="en-US" smtClean="0"/>
               <a:pPr/>
-              <a:t>2/21/10</a:t>
+              <a:t>2/22/2010</a:t>
             </a:fld>
             <a:endParaRPr lang="en-US"/>
           </a:p>
@@ -3457,7 +3457,7 @@
           </a:solidFill>
           <a:effectLst>
             <a:outerShdw blurRad="53975" dist="22860" dir="5400000" algn="tl" rotWithShape="0">
-              <a:srgbClr val="000000">
+              <a:srgbClr xmlns:mc="http://schemas.openxmlformats.org/markup-compatibility/2006" xmlns:a14="http://schemas.microsoft.com/office/drawing/2010/main" val="000000" mc:Ignorable="">
                 <a:alpha val="55000"/>
               </a:srgbClr>
             </a:outerShdw>
@@ -3760,7 +3760,7 @@
 </file>
 
 <file path=ppt/slides/slide1.xml><?xml version="1.0" encoding="utf-8"?>
-<p:sld xmlns:a="http://schemas.openxmlformats.org/drawingml/2006/main" xmlns:r="http://schemas.openxmlformats.org/officeDocument/2006/relationships" xmlns:mc="http://schemas.openxmlformats.org/markup-compatibility/2006" xmlns:mv="urn:schemas-microsoft-com:mac:vml" xmlns:p="http://schemas.openxmlformats.org/presentationml/2006/main" mc:Ignorable="mv" mc:PreserveAttributes="mv:*">
+<p:sld xmlns:a="http://schemas.openxmlformats.org/drawingml/2006/main" xmlns:r="http://schemas.openxmlformats.org/officeDocument/2006/relationships" xmlns:p="http://schemas.openxmlformats.org/presentationml/2006/main">
   <p:cSld>
     <p:spTree>
       <p:nvGrpSpPr>
@@ -3884,7 +3884,7 @@
 </file>
 
 <file path=ppt/slides/slide10.xml><?xml version="1.0" encoding="utf-8"?>
-<p:sld xmlns:a="http://schemas.openxmlformats.org/drawingml/2006/main" xmlns:r="http://schemas.openxmlformats.org/officeDocument/2006/relationships" xmlns:mc="http://schemas.openxmlformats.org/markup-compatibility/2006" xmlns:mv="urn:schemas-microsoft-com:mac:vml" xmlns:p="http://schemas.openxmlformats.org/presentationml/2006/main" mc:Ignorable="mv" mc:PreserveAttributes="mv:*">
+<p:sld xmlns:a="http://schemas.openxmlformats.org/drawingml/2006/main" xmlns:r="http://schemas.openxmlformats.org/officeDocument/2006/relationships" xmlns:p="http://schemas.openxmlformats.org/presentationml/2006/main">
   <p:cSld>
     <p:spTree>
       <p:nvGrpSpPr>
@@ -3954,7 +3954,7 @@
             <a:avLst/>
           </a:prstGeom>
           <a:solidFill>
-            <a:srgbClr val="FFFFFF"/>
+            <a:srgbClr xmlns:mc="http://schemas.openxmlformats.org/markup-compatibility/2006" xmlns:a14="http://schemas.microsoft.com/office/drawing/2010/main" val="FFFFFF" mc:Ignorable=""/>
           </a:solidFill>
           <a:ln w="9525">
             <a:noFill/>
@@ -3973,7 +3973,7 @@
 </file>
 
 <file path=ppt/slides/slide11.xml><?xml version="1.0" encoding="utf-8"?>
-<p:sld xmlns:a="http://schemas.openxmlformats.org/drawingml/2006/main" xmlns:r="http://schemas.openxmlformats.org/officeDocument/2006/relationships" xmlns:mc="http://schemas.openxmlformats.org/markup-compatibility/2006" xmlns:mv="urn:schemas-microsoft-com:mac:vml" xmlns:p="http://schemas.openxmlformats.org/presentationml/2006/main" mc:Ignorable="mv" mc:PreserveAttributes="mv:*">
+<p:sld xmlns:a="http://schemas.openxmlformats.org/drawingml/2006/main" xmlns:r="http://schemas.openxmlformats.org/officeDocument/2006/relationships" xmlns:p="http://schemas.openxmlformats.org/presentationml/2006/main">
   <p:cSld>
     <p:spTree>
       <p:nvGrpSpPr>
@@ -4036,7 +4036,7 @@
             <a:avLst/>
           </a:prstGeom>
           <a:solidFill>
-            <a:srgbClr val="FFFFFF"/>
+            <a:srgbClr xmlns:mc="http://schemas.openxmlformats.org/markup-compatibility/2006" xmlns:a14="http://schemas.microsoft.com/office/drawing/2010/main" val="FFFFFF" mc:Ignorable=""/>
           </a:solidFill>
           <a:ln w="9525">
             <a:noFill/>
@@ -4055,7 +4055,7 @@
 </file>
 
 <file path=ppt/slides/slide12.xml><?xml version="1.0" encoding="utf-8"?>
-<p:sld xmlns:a="http://schemas.openxmlformats.org/drawingml/2006/main" xmlns:r="http://schemas.openxmlformats.org/officeDocument/2006/relationships" xmlns:mc="http://schemas.openxmlformats.org/markup-compatibility/2006" xmlns:mv="urn:schemas-microsoft-com:mac:vml" xmlns:p="http://schemas.openxmlformats.org/presentationml/2006/main" mc:Ignorable="mv" mc:PreserveAttributes="mv:*">
+<p:sld xmlns:a="http://schemas.openxmlformats.org/drawingml/2006/main" xmlns:r="http://schemas.openxmlformats.org/officeDocument/2006/relationships" xmlns:p="http://schemas.openxmlformats.org/presentationml/2006/main">
   <p:cSld>
     <p:spTree>
       <p:nvGrpSpPr>
@@ -4125,7 +4125,7 @@
             <a:avLst/>
           </a:prstGeom>
           <a:solidFill>
-            <a:srgbClr val="FFFFFF"/>
+            <a:srgbClr xmlns:mc="http://schemas.openxmlformats.org/markup-compatibility/2006" xmlns:a14="http://schemas.microsoft.com/office/drawing/2010/main" val="FFFFFF" mc:Ignorable=""/>
           </a:solidFill>
           <a:ln w="9525">
             <a:noFill/>
@@ -4144,7 +4144,7 @@
 </file>
 
 <file path=ppt/slides/slide13.xml><?xml version="1.0" encoding="utf-8"?>
-<p:sld xmlns:a="http://schemas.openxmlformats.org/drawingml/2006/main" xmlns:r="http://schemas.openxmlformats.org/officeDocument/2006/relationships" xmlns:mc="http://schemas.openxmlformats.org/markup-compatibility/2006" xmlns:mv="urn:schemas-microsoft-com:mac:vml" xmlns:p="http://schemas.openxmlformats.org/presentationml/2006/main" mc:Ignorable="mv" mc:PreserveAttributes="mv:*">
+<p:sld xmlns:a="http://schemas.openxmlformats.org/drawingml/2006/main" xmlns:r="http://schemas.openxmlformats.org/officeDocument/2006/relationships" xmlns:p="http://schemas.openxmlformats.org/presentationml/2006/main">
   <p:cSld>
     <p:spTree>
       <p:nvGrpSpPr>
@@ -4209,7 +4209,7 @@
             <a:avLst/>
           </a:prstGeom>
           <a:solidFill>
-            <a:srgbClr val="FFFFFF"/>
+            <a:srgbClr xmlns:mc="http://schemas.openxmlformats.org/markup-compatibility/2006" xmlns:a14="http://schemas.microsoft.com/office/drawing/2010/main" val="FFFFFF" mc:Ignorable=""/>
           </a:solidFill>
           <a:ln w="9525">
             <a:noFill/>
@@ -4243,7 +4243,7 @@
             <a:avLst/>
           </a:prstGeom>
           <a:solidFill>
-            <a:srgbClr val="FFFFFF"/>
+            <a:srgbClr xmlns:mc="http://schemas.openxmlformats.org/markup-compatibility/2006" xmlns:a14="http://schemas.microsoft.com/office/drawing/2010/main" val="FFFFFF" mc:Ignorable=""/>
           </a:solidFill>
           <a:ln w="9525">
             <a:noFill/>
@@ -4262,7 +4262,7 @@
 </file>
 
 <file path=ppt/slides/slide14.xml><?xml version="1.0" encoding="utf-8"?>
-<p:sld xmlns:a="http://schemas.openxmlformats.org/drawingml/2006/main" xmlns:r="http://schemas.openxmlformats.org/officeDocument/2006/relationships" xmlns:mc="http://schemas.openxmlformats.org/markup-compatibility/2006" xmlns:mv="urn:schemas-microsoft-com:mac:vml" xmlns:p="http://schemas.openxmlformats.org/presentationml/2006/main" mc:Ignorable="mv" mc:PreserveAttributes="mv:*">
+<p:sld xmlns:a="http://schemas.openxmlformats.org/drawingml/2006/main" xmlns:r="http://schemas.openxmlformats.org/officeDocument/2006/relationships" xmlns:p="http://schemas.openxmlformats.org/presentationml/2006/main">
   <p:cSld>
     <p:spTree>
       <p:nvGrpSpPr>
@@ -4325,7 +4325,7 @@
             <a:avLst/>
           </a:prstGeom>
           <a:solidFill>
-            <a:srgbClr val="FFFFFF"/>
+            <a:srgbClr xmlns:mc="http://schemas.openxmlformats.org/markup-compatibility/2006" xmlns:a14="http://schemas.microsoft.com/office/drawing/2010/main" val="FFFFFF" mc:Ignorable=""/>
           </a:solidFill>
           <a:ln w="9525">
             <a:noFill/>
@@ -4359,7 +4359,7 @@
             <a:avLst/>
           </a:prstGeom>
           <a:solidFill>
-            <a:srgbClr val="FFFFFF"/>
+            <a:srgbClr xmlns:mc="http://schemas.openxmlformats.org/markup-compatibility/2006" xmlns:a14="http://schemas.microsoft.com/office/drawing/2010/main" val="FFFFFF" mc:Ignorable=""/>
           </a:solidFill>
           <a:ln w="9525">
             <a:noFill/>
@@ -4378,7 +4378,7 @@
 </file>
 
 <file path=ppt/slides/slide15.xml><?xml version="1.0" encoding="utf-8"?>
-<p:sld xmlns:a="http://schemas.openxmlformats.org/drawingml/2006/main" xmlns:r="http://schemas.openxmlformats.org/officeDocument/2006/relationships" xmlns:mc="http://schemas.openxmlformats.org/markup-compatibility/2006" xmlns:mv="urn:schemas-microsoft-com:mac:vml" xmlns:p="http://schemas.openxmlformats.org/presentationml/2006/main" mc:Ignorable="mv" mc:PreserveAttributes="mv:*">
+<p:sld xmlns:a="http://schemas.openxmlformats.org/drawingml/2006/main" xmlns:r="http://schemas.openxmlformats.org/officeDocument/2006/relationships" xmlns:p="http://schemas.openxmlformats.org/presentationml/2006/main">
   <p:cSld>
     <p:spTree>
       <p:nvGrpSpPr>
@@ -4490,7 +4490,7 @@
 </file>
 
 <file path=ppt/slides/slide2.xml><?xml version="1.0" encoding="utf-8"?>
-<p:sld xmlns:a="http://schemas.openxmlformats.org/drawingml/2006/main" xmlns:r="http://schemas.openxmlformats.org/officeDocument/2006/relationships" xmlns:mc="http://schemas.openxmlformats.org/markup-compatibility/2006" xmlns:mv="urn:schemas-microsoft-com:mac:vml" xmlns:p="http://schemas.openxmlformats.org/presentationml/2006/main" mc:Ignorable="mv" mc:PreserveAttributes="mv:*">
+<p:sld xmlns:a="http://schemas.openxmlformats.org/drawingml/2006/main" xmlns:r="http://schemas.openxmlformats.org/officeDocument/2006/relationships" xmlns:p="http://schemas.openxmlformats.org/presentationml/2006/main">
   <p:cSld>
     <p:spTree>
       <p:nvGrpSpPr>
@@ -4565,7 +4565,7 @@
                 </a:solidFill>
                 <a:effectLst>
                   <a:outerShdw blurRad="38100" dist="38100" dir="2700000" algn="tl">
-                    <a:srgbClr val="000000">
+                    <a:srgbClr xmlns:mc="http://schemas.openxmlformats.org/markup-compatibility/2006" xmlns:a14="http://schemas.microsoft.com/office/drawing/2010/main" val="000000" mc:Ignorable="">
                       <a:alpha val="43137"/>
                     </a:srgbClr>
                   </a:outerShdw>
@@ -4580,7 +4580,7 @@
                 </a:solidFill>
                 <a:effectLst>
                   <a:outerShdw blurRad="38100" dist="38100" dir="2700000" algn="tl">
-                    <a:srgbClr val="000000">
+                    <a:srgbClr xmlns:mc="http://schemas.openxmlformats.org/markup-compatibility/2006" xmlns:a14="http://schemas.microsoft.com/office/drawing/2010/main" val="000000" mc:Ignorable="">
                       <a:alpha val="43137"/>
                     </a:srgbClr>
                   </a:outerShdw>
@@ -4603,11 +4603,7 @@
             </a:pPr>
             <a:r>
               <a:rPr lang="en-US" dirty="0" smtClean="0"/>
-              <a:t> Add</a:t>
-            </a:r>
-            <a:r>
-              <a:rPr lang="en-US" dirty="0" smtClean="0"/>
-              <a:t>, edit, and delete income, expense, and transfer transactions through the entry menu</a:t>
+              <a:t> Add, edit, and delete income, expense, and transfer transactions through the entry menu</a:t>
             </a:r>
           </a:p>
           <a:p>
@@ -4621,11 +4617,7 @@
             </a:pPr>
             <a:r>
               <a:rPr lang="en-US" dirty="0" smtClean="0"/>
-              <a:t> Query </a:t>
-            </a:r>
-            <a:r>
-              <a:rPr lang="en-US" dirty="0" smtClean="0"/>
-              <a:t>these transactions through the audit menu in the application.</a:t>
+              <a:t> Query these transactions through the audit menu in the application.</a:t>
             </a:r>
           </a:p>
           <a:p>
@@ -4642,11 +4634,7 @@
             </a:pPr>
             <a:r>
               <a:rPr lang="en-US" dirty="0" smtClean="0"/>
-              <a:t> View </a:t>
-            </a:r>
-            <a:r>
-              <a:rPr lang="en-US" dirty="0" smtClean="0"/>
-              <a:t>a grand total of how much money they have made or lost on the home menu</a:t>
+              <a:t> View a grand total of how much money they have made or lost on the home menu</a:t>
             </a:r>
           </a:p>
           <a:p>
@@ -4663,11 +4651,7 @@
             </a:pPr>
             <a:r>
               <a:rPr lang="en-US" dirty="0" smtClean="0"/>
-              <a:t> Use </a:t>
-            </a:r>
-            <a:r>
-              <a:rPr lang="en-US" dirty="0" smtClean="0"/>
-              <a:t>a handful of specially designed tools such as YATC (Yet Another Tip Calculator), export data, or view data as graphs in the tool menu</a:t>
+              <a:t> Use a handful of specially designed tools such as YATC (Yet Another Tip Calculator), export data, or view data as graphs in the tool menu</a:t>
             </a:r>
           </a:p>
         </p:txBody>
@@ -4681,7 +4665,7 @@
 </file>
 
 <file path=ppt/slides/slide3.xml><?xml version="1.0" encoding="utf-8"?>
-<p:sld xmlns:a="http://schemas.openxmlformats.org/drawingml/2006/main" xmlns:r="http://schemas.openxmlformats.org/officeDocument/2006/relationships" xmlns:mc="http://schemas.openxmlformats.org/markup-compatibility/2006" xmlns:mv="urn:schemas-microsoft-com:mac:vml" xmlns:p="http://schemas.openxmlformats.org/presentationml/2006/main" mc:Ignorable="mv" mc:PreserveAttributes="mv:*">
+<p:sld xmlns:a="http://schemas.openxmlformats.org/drawingml/2006/main" xmlns:r="http://schemas.openxmlformats.org/officeDocument/2006/relationships" xmlns:p="http://schemas.openxmlformats.org/presentationml/2006/main">
   <p:cSld>
     <p:spTree>
       <p:nvGrpSpPr>
@@ -4724,7 +4708,7 @@
                 </a:solidFill>
                 <a:effectLst>
                   <a:outerShdw blurRad="38100" dist="38100" dir="2700000" algn="tl">
-                    <a:srgbClr val="000000">
+                    <a:srgbClr xmlns:mc="http://schemas.openxmlformats.org/markup-compatibility/2006" xmlns:a14="http://schemas.microsoft.com/office/drawing/2010/main" val="000000" mc:Ignorable="">
                       <a:alpha val="43137"/>
                     </a:srgbClr>
                   </a:outerShdw>
@@ -4739,7 +4723,7 @@
                 </a:solidFill>
                 <a:effectLst>
                   <a:outerShdw blurRad="38100" dist="38100" dir="2700000" algn="tl">
-                    <a:srgbClr val="000000">
+                    <a:srgbClr xmlns:mc="http://schemas.openxmlformats.org/markup-compatibility/2006" xmlns:a14="http://schemas.microsoft.com/office/drawing/2010/main" val="000000" mc:Ignorable="">
                       <a:alpha val="43137"/>
                     </a:srgbClr>
                   </a:outerShdw>
@@ -4804,23 +4788,7 @@
           <a:p>
             <a:r>
               <a:rPr lang="en-US" dirty="0" smtClean="0"/>
-              <a:t>They</a:t>
-            </a:r>
-            <a:r>
-              <a:rPr lang="en-US" dirty="0" smtClean="0"/>
-              <a:t> </a:t>
-            </a:r>
-            <a:r>
-              <a:rPr lang="en-US" dirty="0" smtClean="0"/>
-              <a:t>are expected to </a:t>
-            </a:r>
-            <a:r>
-              <a:rPr lang="en-US" dirty="0" smtClean="0"/>
-              <a:t>be </a:t>
-            </a:r>
-            <a:r>
-              <a:rPr lang="en-US" dirty="0" smtClean="0"/>
-              <a:t>able to access the preferences and help menus from the bottom pop-up bar on the phone</a:t>
+              <a:t>They are expected to be able to access the preferences and help menus from the bottom pop-up bar on the phone</a:t>
             </a:r>
           </a:p>
           <a:p>
@@ -4831,7 +4799,6 @@
               <a:rPr lang="en-US" dirty="0" smtClean="0"/>
               <a:t>Be able to export data and use the YATC in the tools menu</a:t>
             </a:r>
-            <a:endParaRPr lang="en-US" dirty="0" smtClean="0"/>
           </a:p>
           <a:p>
             <a:pPr>
@@ -4862,15 +4829,7 @@
           <a:p>
             <a:r>
               <a:rPr lang="en-US" dirty="0" smtClean="0"/>
-              <a:t>An advanced user will enjoy all of the same functionality</a:t>
-            </a:r>
-            <a:r>
-              <a:rPr lang="en-US" dirty="0" smtClean="0"/>
-              <a:t> as the </a:t>
-            </a:r>
-            <a:r>
-              <a:rPr lang="en-US" dirty="0" smtClean="0"/>
-              <a:t>“normal user” </a:t>
+              <a:t>An advanced user will enjoy all of the same functionality as the “normal user” </a:t>
             </a:r>
           </a:p>
           <a:p>
@@ -4888,31 +4847,7 @@
           <a:p>
             <a:r>
               <a:rPr lang="en-US" dirty="0" smtClean="0"/>
-              <a:t>A</a:t>
-            </a:r>
-            <a:r>
-              <a:rPr lang="en-US" dirty="0" smtClean="0"/>
-              <a:t>dvanced users </a:t>
-            </a:r>
-            <a:r>
-              <a:rPr lang="en-US" dirty="0" smtClean="0"/>
-              <a:t>will find it easy to query transactions </a:t>
-            </a:r>
-            <a:r>
-              <a:rPr lang="en-US" dirty="0" smtClean="0"/>
-              <a:t>based on </a:t>
-            </a:r>
-            <a:r>
-              <a:rPr lang="en-US" dirty="0" smtClean="0"/>
-              <a:t>a date range, category, account, etcetera</a:t>
-            </a:r>
-            <a:r>
-              <a:rPr lang="en-US" dirty="0" smtClean="0"/>
-              <a:t> </a:t>
-            </a:r>
-            <a:r>
-              <a:rPr lang="en-US" dirty="0" smtClean="0"/>
-              <a:t>to create an informative list of transactions or informative graphs</a:t>
+              <a:t>Advanced users will find it easy to query transactions based on a date range, category, account, etcetera to create an informative list of transactions or informative graphs</a:t>
             </a:r>
             <a:endParaRPr lang="en-US" dirty="0"/>
           </a:p>
@@ -4927,7 +4862,7 @@
 </file>
 
 <file path=ppt/slides/slide4.xml><?xml version="1.0" encoding="utf-8"?>
-<p:sld xmlns:a="http://schemas.openxmlformats.org/drawingml/2006/main" xmlns:r="http://schemas.openxmlformats.org/officeDocument/2006/relationships" xmlns:mc="http://schemas.openxmlformats.org/markup-compatibility/2006" xmlns:mv="urn:schemas-microsoft-com:mac:vml" xmlns:p="http://schemas.openxmlformats.org/presentationml/2006/main" mc:Ignorable="mv" mc:PreserveAttributes="mv:*">
+<p:sld xmlns:a="http://schemas.openxmlformats.org/drawingml/2006/main" xmlns:r="http://schemas.openxmlformats.org/officeDocument/2006/relationships" xmlns:p="http://schemas.openxmlformats.org/presentationml/2006/main">
   <p:cSld>
     <p:spTree>
       <p:nvGrpSpPr>
@@ -4962,11 +4897,7 @@
           <a:p>
             <a:r>
               <a:rPr lang="en-US" dirty="0" smtClean="0"/>
-              <a:t>Nonfunctional </a:t>
-            </a:r>
-            <a:r>
-              <a:rPr lang="en-US" dirty="0" smtClean="0"/>
-              <a:t>Requirements</a:t>
+              <a:t>Nonfunctional Requirements</a:t>
             </a:r>
             <a:endParaRPr lang="en-US" dirty="0"/>
           </a:p>
@@ -5016,11 +4947,7 @@
             </a:pPr>
             <a:r>
               <a:rPr lang="en-US" dirty="0" smtClean="0"/>
-              <a:t>	Users must be able to navigate through tabbed menus in order to add transactions, review data, and access </a:t>
-            </a:r>
-            <a:r>
-              <a:rPr lang="en-US" dirty="0" smtClean="0"/>
-              <a:t>tools</a:t>
+              <a:t>	Users must be able to navigate through tabbed menus in order to add transactions, review data, and access tools</a:t>
             </a:r>
             <a:br>
               <a:rPr lang="en-US" dirty="0" smtClean="0"/>
@@ -5061,11 +4988,7 @@
             <a:pPr marL="514350" indent="-514350"/>
             <a:r>
               <a:rPr lang="en-US" dirty="0" smtClean="0"/>
-              <a:t>When a force close happens, the user should be given the opportunity to restart the application</a:t>
-            </a:r>
-            <a:r>
-              <a:rPr lang="en-US" dirty="0" smtClean="0"/>
-              <a:t>.</a:t>
+              <a:t>When a force close happens, the user should be given the opportunity to restart the application.</a:t>
             </a:r>
             <a:br>
               <a:rPr lang="en-US" dirty="0" smtClean="0"/>
@@ -5128,7 +5051,7 @@
 </file>
 
 <file path=ppt/slides/slide5.xml><?xml version="1.0" encoding="utf-8"?>
-<p:sld xmlns:a="http://schemas.openxmlformats.org/drawingml/2006/main" xmlns:r="http://schemas.openxmlformats.org/officeDocument/2006/relationships" xmlns:mc="http://schemas.openxmlformats.org/markup-compatibility/2006" xmlns:mv="urn:schemas-microsoft-com:mac:vml" xmlns:p="http://schemas.openxmlformats.org/presentationml/2006/main" mc:Ignorable="mv" mc:PreserveAttributes="mv:*">
+<p:sld xmlns:a="http://schemas.openxmlformats.org/drawingml/2006/main" xmlns:r="http://schemas.openxmlformats.org/officeDocument/2006/relationships" xmlns:p="http://schemas.openxmlformats.org/presentationml/2006/main">
   <p:cSld>
     <p:spTree>
       <p:nvGrpSpPr>
@@ -5177,7 +5100,7 @@
                 </a:solidFill>
                 <a:effectLst>
                   <a:outerShdw blurRad="38100" dist="38100" dir="2700000" algn="tl">
-                    <a:srgbClr val="000000">
+                    <a:srgbClr xmlns:mc="http://schemas.openxmlformats.org/markup-compatibility/2006" xmlns:a14="http://schemas.microsoft.com/office/drawing/2010/main" val="000000" mc:Ignorable="">
                       <a:alpha val="43137"/>
                     </a:srgbClr>
                   </a:outerShdw>
@@ -5187,11 +5110,7 @@
             </a:r>
             <a:r>
               <a:rPr lang="en-US" dirty="0" smtClean="0"/>
-              <a:t> </a:t>
-            </a:r>
-            <a:r>
-              <a:rPr lang="en-US" dirty="0" smtClean="0"/>
-              <a:t>(Cont.)</a:t>
+              <a:t> (Cont.)</a:t>
             </a:r>
             <a:endParaRPr lang="en-US" dirty="0"/>
           </a:p>
@@ -5245,11 +5164,7 @@
             </a:pPr>
             <a:r>
               <a:rPr lang="en-US" sz="2400" dirty="0" smtClean="0"/>
-              <a:t>	As of right now we do not have a plan of issuing updates to users</a:t>
-            </a:r>
-            <a:r>
-              <a:rPr lang="en-US" sz="2400" dirty="0" smtClean="0"/>
-              <a:t>.</a:t>
+              <a:t>	As of right now we do not have a plan of issuing updates to users.</a:t>
             </a:r>
             <a:br>
               <a:rPr lang="en-US" sz="2400" dirty="0" smtClean="0"/>
@@ -5283,11 +5198,7 @@
             </a:pPr>
             <a:r>
               <a:rPr lang="en-US" sz="2400" dirty="0" smtClean="0"/>
-              <a:t>	Any user who installs the application to their mobile device running an Android operating system, version 1.5 or higher, should have complete access to it at all times in which the application will be completely functional</a:t>
-            </a:r>
-            <a:r>
-              <a:rPr lang="en-US" sz="2400" dirty="0" smtClean="0"/>
-              <a:t>.</a:t>
+              <a:t>	Any user who installs the application to their mobile device running an Android operating system, version 1.5 or higher, should have complete access to it at all times in which the application will be completely functional.</a:t>
             </a:r>
             <a:br>
               <a:rPr lang="en-US" sz="2400" dirty="0" smtClean="0"/>
@@ -5329,11 +5240,7 @@
             </a:r>
             <a:r>
               <a:rPr lang="en-US" sz="2400" dirty="0" smtClean="0"/>
-              <a:t> application will run on Android operating systems, API 1.5 and higher. This is the general population of Android users</a:t>
-            </a:r>
-            <a:r>
-              <a:rPr lang="en-US" sz="2400" dirty="0" smtClean="0"/>
-              <a:t>.</a:t>
+              <a:t> application will run on Android operating systems, API 1.5 and higher. This is the general population of Android users.</a:t>
             </a:r>
             <a:br>
               <a:rPr lang="en-US" sz="2400" dirty="0" smtClean="0"/>
@@ -5434,7 +5341,7 @@
 </file>
 
 <file path=ppt/slides/slide6.xml><?xml version="1.0" encoding="utf-8"?>
-<p:sld xmlns:a="http://schemas.openxmlformats.org/drawingml/2006/main" xmlns:r="http://schemas.openxmlformats.org/officeDocument/2006/relationships" xmlns:mc="http://schemas.openxmlformats.org/markup-compatibility/2006" xmlns:mv="urn:schemas-microsoft-com:mac:vml" xmlns:p="http://schemas.openxmlformats.org/presentationml/2006/main" mc:Ignorable="mv" mc:PreserveAttributes="mv:*">
+<p:sld xmlns:a="http://schemas.openxmlformats.org/drawingml/2006/main" xmlns:r="http://schemas.openxmlformats.org/officeDocument/2006/relationships" xmlns:p="http://schemas.openxmlformats.org/presentationml/2006/main">
   <p:cSld>
     <p:spTree>
       <p:nvGrpSpPr>
@@ -5590,7 +5497,7 @@
 </file>
 
 <file path=ppt/slides/slide7.xml><?xml version="1.0" encoding="utf-8"?>
-<p:sld xmlns:a="http://schemas.openxmlformats.org/drawingml/2006/main" xmlns:r="http://schemas.openxmlformats.org/officeDocument/2006/relationships" xmlns:mc="http://schemas.openxmlformats.org/markup-compatibility/2006" xmlns:mv="urn:schemas-microsoft-com:mac:vml" xmlns:p="http://schemas.openxmlformats.org/presentationml/2006/main" mc:Ignorable="mv" mc:PreserveAttributes="mv:*">
+<p:sld xmlns:a="http://schemas.openxmlformats.org/drawingml/2006/main" xmlns:r="http://schemas.openxmlformats.org/officeDocument/2006/relationships" xmlns:p="http://schemas.openxmlformats.org/presentationml/2006/main">
   <p:cSld>
     <p:spTree>
       <p:nvGrpSpPr>
@@ -5765,7 +5672,7 @@
 </file>
 
 <file path=ppt/slides/slide8.xml><?xml version="1.0" encoding="utf-8"?>
-<p:sld xmlns:a="http://schemas.openxmlformats.org/drawingml/2006/main" xmlns:r="http://schemas.openxmlformats.org/officeDocument/2006/relationships" xmlns:mc="http://schemas.openxmlformats.org/markup-compatibility/2006" xmlns:mv="urn:schemas-microsoft-com:mac:vml" xmlns:p="http://schemas.openxmlformats.org/presentationml/2006/main" mc:Ignorable="mv" mc:PreserveAttributes="mv:*">
+<p:sld xmlns:a="http://schemas.openxmlformats.org/drawingml/2006/main" xmlns:r="http://schemas.openxmlformats.org/officeDocument/2006/relationships" xmlns:p="http://schemas.openxmlformats.org/presentationml/2006/main">
   <p:cSld>
     <p:spTree>
       <p:nvGrpSpPr>
@@ -5836,7 +5743,7 @@
         </p:nvSpPr>
         <p:spPr>
           <a:xfrm rot="21286768">
-            <a:off x="259881" y="764424"/>
+            <a:off x="-135101" y="1436369"/>
             <a:ext cx="3122399" cy="522593"/>
           </a:xfrm>
         </p:spPr>
@@ -5874,14 +5781,14 @@
         </p:blipFill>
         <p:spPr bwMode="auto">
           <a:xfrm>
-            <a:off x="2438400" y="339469"/>
-            <a:ext cx="6248400" cy="5833164"/>
+            <a:off x="2895600" y="0"/>
+            <a:ext cx="6248400" cy="6857999"/>
           </a:xfrm>
           <a:prstGeom prst="rect">
             <a:avLst/>
           </a:prstGeom>
           <a:solidFill>
-            <a:srgbClr val="FFFFFF"/>
+            <a:srgbClr xmlns:mc="http://schemas.openxmlformats.org/markup-compatibility/2006" xmlns:a14="http://schemas.microsoft.com/office/drawing/2010/main" val="FFFFFF" mc:Ignorable=""/>
           </a:solidFill>
           <a:ln w="9525">
             <a:noFill/>
@@ -5900,7 +5807,7 @@
 </file>
 
 <file path=ppt/slides/slide9.xml><?xml version="1.0" encoding="utf-8"?>
-<p:sld xmlns:a="http://schemas.openxmlformats.org/drawingml/2006/main" xmlns:r="http://schemas.openxmlformats.org/officeDocument/2006/relationships" xmlns:mc="http://schemas.openxmlformats.org/markup-compatibility/2006" xmlns:mv="urn:schemas-microsoft-com:mac:vml" xmlns:p="http://schemas.openxmlformats.org/presentationml/2006/main" mc:Ignorable="mv" mc:PreserveAttributes="mv:*">
+<p:sld xmlns:a="http://schemas.openxmlformats.org/drawingml/2006/main" xmlns:r="http://schemas.openxmlformats.org/officeDocument/2006/relationships" xmlns:p="http://schemas.openxmlformats.org/presentationml/2006/main">
   <p:cSld>
     <p:spTree>
       <p:nvGrpSpPr>
@@ -5956,7 +5863,7 @@
         </p:nvGraphicFramePr>
         <p:xfrm>
           <a:off x="793866" y="748145"/>
-          <a:ext cx="7463444" cy="4510647"/>
+          <a:ext cx="7463444" cy="4510648"/>
         </p:xfrm>
         <a:graphic>
           <a:graphicData uri="http://schemas.openxmlformats.org/drawingml/2006/table">
@@ -5992,7 +5899,7 @@
                   <a:tcPr marL="34925" marR="34925" marT="34925" marB="34925">
                     <a:lnL w="12700" cap="flat" cmpd="sng" algn="ctr">
                       <a:solidFill>
-                        <a:srgbClr val="000000"/>
+                        <a:srgbClr xmlns:mc="http://schemas.openxmlformats.org/markup-compatibility/2006" xmlns:a14="http://schemas.microsoft.com/office/drawing/2010/main" val="000000" mc:Ignorable=""/>
                       </a:solidFill>
                       <a:prstDash val="solid"/>
                       <a:round/>
@@ -6001,7 +5908,7 @@
                     </a:lnL>
                     <a:lnR w="12700" cap="flat" cmpd="sng" algn="ctr">
                       <a:solidFill>
-                        <a:srgbClr val="000000"/>
+                        <a:srgbClr xmlns:mc="http://schemas.openxmlformats.org/markup-compatibility/2006" xmlns:a14="http://schemas.microsoft.com/office/drawing/2010/main" val="000000" mc:Ignorable=""/>
                       </a:solidFill>
                       <a:prstDash val="solid"/>
                       <a:round/>
@@ -6010,7 +5917,7 @@
                     </a:lnR>
                     <a:lnT w="12700" cap="flat" cmpd="sng" algn="ctr">
                       <a:solidFill>
-                        <a:srgbClr val="000000"/>
+                        <a:srgbClr xmlns:mc="http://schemas.openxmlformats.org/markup-compatibility/2006" xmlns:a14="http://schemas.microsoft.com/office/drawing/2010/main" val="000000" mc:Ignorable=""/>
                       </a:solidFill>
                       <a:prstDash val="solid"/>
                       <a:round/>
@@ -6019,7 +5926,7 @@
                     </a:lnT>
                     <a:lnB w="12700" cap="flat" cmpd="sng" algn="ctr">
                       <a:solidFill>
-                        <a:srgbClr val="000000"/>
+                        <a:srgbClr xmlns:mc="http://schemas.openxmlformats.org/markup-compatibility/2006" xmlns:a14="http://schemas.microsoft.com/office/drawing/2010/main" val="000000" mc:Ignorable=""/>
                       </a:solidFill>
                       <a:prstDash val="solid"/>
                       <a:round/>
@@ -6057,7 +5964,7 @@
                   <a:tcPr marL="34925" marR="34925" marT="34925" marB="34925">
                     <a:lnL w="12700" cap="flat" cmpd="sng" algn="ctr">
                       <a:solidFill>
-                        <a:srgbClr val="000000"/>
+                        <a:srgbClr xmlns:mc="http://schemas.openxmlformats.org/markup-compatibility/2006" xmlns:a14="http://schemas.microsoft.com/office/drawing/2010/main" val="000000" mc:Ignorable=""/>
                       </a:solidFill>
                       <a:prstDash val="solid"/>
                       <a:round/>
@@ -6066,7 +5973,7 @@
                     </a:lnL>
                     <a:lnR w="12700" cap="flat" cmpd="sng" algn="ctr">
                       <a:solidFill>
-                        <a:srgbClr val="000000"/>
+                        <a:srgbClr xmlns:mc="http://schemas.openxmlformats.org/markup-compatibility/2006" xmlns:a14="http://schemas.microsoft.com/office/drawing/2010/main" val="000000" mc:Ignorable=""/>
                       </a:solidFill>
                       <a:prstDash val="solid"/>
                       <a:round/>
@@ -6075,7 +5982,7 @@
                     </a:lnR>
                     <a:lnT w="12700" cap="flat" cmpd="sng" algn="ctr">
                       <a:solidFill>
-                        <a:srgbClr val="000000"/>
+                        <a:srgbClr xmlns:mc="http://schemas.openxmlformats.org/markup-compatibility/2006" xmlns:a14="http://schemas.microsoft.com/office/drawing/2010/main" val="000000" mc:Ignorable=""/>
                       </a:solidFill>
                       <a:prstDash val="solid"/>
                       <a:round/>
@@ -6084,7 +5991,7 @@
                     </a:lnT>
                     <a:lnB w="12700" cap="flat" cmpd="sng" algn="ctr">
                       <a:solidFill>
-                        <a:srgbClr val="000000"/>
+                        <a:srgbClr xmlns:mc="http://schemas.openxmlformats.org/markup-compatibility/2006" xmlns:a14="http://schemas.microsoft.com/office/drawing/2010/main" val="000000" mc:Ignorable=""/>
                       </a:solidFill>
                       <a:prstDash val="solid"/>
                       <a:round/>
@@ -6120,7 +6027,7 @@
                   <a:tcPr marL="34925" marR="34925" marT="34925" marB="34925">
                     <a:lnL w="12700" cap="flat" cmpd="sng" algn="ctr">
                       <a:solidFill>
-                        <a:srgbClr val="000000"/>
+                        <a:srgbClr xmlns:mc="http://schemas.openxmlformats.org/markup-compatibility/2006" xmlns:a14="http://schemas.microsoft.com/office/drawing/2010/main" val="000000" mc:Ignorable=""/>
                       </a:solidFill>
                       <a:prstDash val="solid"/>
                       <a:round/>
@@ -6129,7 +6036,7 @@
                     </a:lnL>
                     <a:lnR w="12700" cap="flat" cmpd="sng" algn="ctr">
                       <a:solidFill>
-                        <a:srgbClr val="000000"/>
+                        <a:srgbClr xmlns:mc="http://schemas.openxmlformats.org/markup-compatibility/2006" xmlns:a14="http://schemas.microsoft.com/office/drawing/2010/main" val="000000" mc:Ignorable=""/>
                       </a:solidFill>
                       <a:prstDash val="solid"/>
                       <a:round/>
@@ -6138,7 +6045,7 @@
                     </a:lnR>
                     <a:lnT w="12700" cap="flat" cmpd="sng" algn="ctr">
                       <a:solidFill>
-                        <a:srgbClr val="000000"/>
+                        <a:srgbClr xmlns:mc="http://schemas.openxmlformats.org/markup-compatibility/2006" xmlns:a14="http://schemas.microsoft.com/office/drawing/2010/main" val="000000" mc:Ignorable=""/>
                       </a:solidFill>
                       <a:prstDash val="solid"/>
                       <a:round/>
@@ -6147,7 +6054,7 @@
                     </a:lnT>
                     <a:lnB w="12700" cap="flat" cmpd="sng" algn="ctr">
                       <a:solidFill>
-                        <a:srgbClr val="000000"/>
+                        <a:srgbClr xmlns:mc="http://schemas.openxmlformats.org/markup-compatibility/2006" xmlns:a14="http://schemas.microsoft.com/office/drawing/2010/main" val="000000" mc:Ignorable=""/>
                       </a:solidFill>
                       <a:prstDash val="solid"/>
                       <a:round/>
@@ -6181,7 +6088,7 @@
                   <a:tcPr marL="34925" marR="34925" marT="34925" marB="34925">
                     <a:lnL w="12700" cap="flat" cmpd="sng" algn="ctr">
                       <a:solidFill>
-                        <a:srgbClr val="000000"/>
+                        <a:srgbClr xmlns:mc="http://schemas.openxmlformats.org/markup-compatibility/2006" xmlns:a14="http://schemas.microsoft.com/office/drawing/2010/main" val="000000" mc:Ignorable=""/>
                       </a:solidFill>
                       <a:prstDash val="solid"/>
                       <a:round/>
@@ -6190,7 +6097,7 @@
                     </a:lnL>
                     <a:lnR w="12700" cap="flat" cmpd="sng" algn="ctr">
                       <a:solidFill>
-                        <a:srgbClr val="000000"/>
+                        <a:srgbClr xmlns:mc="http://schemas.openxmlformats.org/markup-compatibility/2006" xmlns:a14="http://schemas.microsoft.com/office/drawing/2010/main" val="000000" mc:Ignorable=""/>
                       </a:solidFill>
                       <a:prstDash val="solid"/>
                       <a:round/>
@@ -6199,7 +6106,7 @@
                     </a:lnR>
                     <a:lnT w="12700" cap="flat" cmpd="sng" algn="ctr">
                       <a:solidFill>
-                        <a:srgbClr val="000000"/>
+                        <a:srgbClr xmlns:mc="http://schemas.openxmlformats.org/markup-compatibility/2006" xmlns:a14="http://schemas.microsoft.com/office/drawing/2010/main" val="000000" mc:Ignorable=""/>
                       </a:solidFill>
                       <a:prstDash val="solid"/>
                       <a:round/>
@@ -6208,7 +6115,7 @@
                     </a:lnT>
                     <a:lnB w="12700" cap="flat" cmpd="sng" algn="ctr">
                       <a:solidFill>
-                        <a:srgbClr val="000000"/>
+                        <a:srgbClr xmlns:mc="http://schemas.openxmlformats.org/markup-compatibility/2006" xmlns:a14="http://schemas.microsoft.com/office/drawing/2010/main" val="000000" mc:Ignorable=""/>
                       </a:solidFill>
                       <a:prstDash val="solid"/>
                       <a:round/>
@@ -6244,7 +6151,7 @@
                   <a:tcPr marL="34925" marR="34925" marT="34925" marB="34925">
                     <a:lnL w="12700" cap="flat" cmpd="sng" algn="ctr">
                       <a:solidFill>
-                        <a:srgbClr val="000000"/>
+                        <a:srgbClr xmlns:mc="http://schemas.openxmlformats.org/markup-compatibility/2006" xmlns:a14="http://schemas.microsoft.com/office/drawing/2010/main" val="000000" mc:Ignorable=""/>
                       </a:solidFill>
                       <a:prstDash val="solid"/>
                       <a:round/>
@@ -6253,7 +6160,7 @@
                     </a:lnL>
                     <a:lnR w="12700" cap="flat" cmpd="sng" algn="ctr">
                       <a:solidFill>
-                        <a:srgbClr val="000000"/>
+                        <a:srgbClr xmlns:mc="http://schemas.openxmlformats.org/markup-compatibility/2006" xmlns:a14="http://schemas.microsoft.com/office/drawing/2010/main" val="000000" mc:Ignorable=""/>
                       </a:solidFill>
                       <a:prstDash val="solid"/>
                       <a:round/>
@@ -6262,7 +6169,7 @@
                     </a:lnR>
                     <a:lnT w="12700" cap="flat" cmpd="sng" algn="ctr">
                       <a:solidFill>
-                        <a:srgbClr val="000000"/>
+                        <a:srgbClr xmlns:mc="http://schemas.openxmlformats.org/markup-compatibility/2006" xmlns:a14="http://schemas.microsoft.com/office/drawing/2010/main" val="000000" mc:Ignorable=""/>
                       </a:solidFill>
                       <a:prstDash val="solid"/>
                       <a:round/>
@@ -6271,7 +6178,7 @@
                     </a:lnT>
                     <a:lnB w="12700" cap="flat" cmpd="sng" algn="ctr">
                       <a:solidFill>
-                        <a:srgbClr val="000000"/>
+                        <a:srgbClr xmlns:mc="http://schemas.openxmlformats.org/markup-compatibility/2006" xmlns:a14="http://schemas.microsoft.com/office/drawing/2010/main" val="000000" mc:Ignorable=""/>
                       </a:solidFill>
                       <a:prstDash val="solid"/>
                       <a:round/>
@@ -6432,7 +6339,7 @@
                   <a:tcPr marL="34925" marR="34925" marT="34925" marB="34925">
                     <a:lnL w="12700" cap="flat" cmpd="sng" algn="ctr">
                       <a:solidFill>
-                        <a:srgbClr val="000000"/>
+                        <a:srgbClr xmlns:mc="http://schemas.openxmlformats.org/markup-compatibility/2006" xmlns:a14="http://schemas.microsoft.com/office/drawing/2010/main" val="000000" mc:Ignorable=""/>
                       </a:solidFill>
                       <a:prstDash val="solid"/>
                       <a:round/>
@@ -6441,7 +6348,7 @@
                     </a:lnL>
                     <a:lnR w="12700" cap="flat" cmpd="sng" algn="ctr">
                       <a:solidFill>
-                        <a:srgbClr val="000000"/>
+                        <a:srgbClr xmlns:mc="http://schemas.openxmlformats.org/markup-compatibility/2006" xmlns:a14="http://schemas.microsoft.com/office/drawing/2010/main" val="000000" mc:Ignorable=""/>
                       </a:solidFill>
                       <a:prstDash val="solid"/>
                       <a:round/>
@@ -6450,7 +6357,7 @@
                     </a:lnR>
                     <a:lnT w="12700" cap="flat" cmpd="sng" algn="ctr">
                       <a:solidFill>
-                        <a:srgbClr val="000000"/>
+                        <a:srgbClr xmlns:mc="http://schemas.openxmlformats.org/markup-compatibility/2006" xmlns:a14="http://schemas.microsoft.com/office/drawing/2010/main" val="000000" mc:Ignorable=""/>
                       </a:solidFill>
                       <a:prstDash val="solid"/>
                       <a:round/>
@@ -6459,7 +6366,7 @@
                     </a:lnT>
                     <a:lnB w="12700" cap="flat" cmpd="sng" algn="ctr">
                       <a:solidFill>
-                        <a:srgbClr val="000000"/>
+                        <a:srgbClr xmlns:mc="http://schemas.openxmlformats.org/markup-compatibility/2006" xmlns:a14="http://schemas.microsoft.com/office/drawing/2010/main" val="000000" mc:Ignorable=""/>
                       </a:solidFill>
                       <a:prstDash val="solid"/>
                       <a:round/>
@@ -6495,7 +6402,7 @@
                   <a:tcPr marL="34925" marR="34925" marT="34925" marB="34925">
                     <a:lnL w="12700" cap="flat" cmpd="sng" algn="ctr">
                       <a:solidFill>
-                        <a:srgbClr val="000000"/>
+                        <a:srgbClr xmlns:mc="http://schemas.openxmlformats.org/markup-compatibility/2006" xmlns:a14="http://schemas.microsoft.com/office/drawing/2010/main" val="000000" mc:Ignorable=""/>
                       </a:solidFill>
                       <a:prstDash val="solid"/>
                       <a:round/>
@@ -6504,7 +6411,7 @@
                     </a:lnL>
                     <a:lnR w="12700" cap="flat" cmpd="sng" algn="ctr">
                       <a:solidFill>
-                        <a:srgbClr val="000000"/>
+                        <a:srgbClr xmlns:mc="http://schemas.openxmlformats.org/markup-compatibility/2006" xmlns:a14="http://schemas.microsoft.com/office/drawing/2010/main" val="000000" mc:Ignorable=""/>
                       </a:solidFill>
                       <a:prstDash val="solid"/>
                       <a:round/>
@@ -6513,7 +6420,7 @@
                     </a:lnR>
                     <a:lnT w="12700" cap="flat" cmpd="sng" algn="ctr">
                       <a:solidFill>
-                        <a:srgbClr val="000000"/>
+                        <a:srgbClr xmlns:mc="http://schemas.openxmlformats.org/markup-compatibility/2006" xmlns:a14="http://schemas.microsoft.com/office/drawing/2010/main" val="000000" mc:Ignorable=""/>
                       </a:solidFill>
                       <a:prstDash val="solid"/>
                       <a:round/>
@@ -6522,7 +6429,7 @@
                     </a:lnT>
                     <a:lnB w="12700" cap="flat" cmpd="sng" algn="ctr">
                       <a:solidFill>
-                        <a:srgbClr val="000000"/>
+                        <a:srgbClr xmlns:mc="http://schemas.openxmlformats.org/markup-compatibility/2006" xmlns:a14="http://schemas.microsoft.com/office/drawing/2010/main" val="000000" mc:Ignorable=""/>
                       </a:solidFill>
                       <a:prstDash val="solid"/>
                       <a:round/>
@@ -6556,7 +6463,7 @@
                   <a:tcPr marL="34925" marR="34925" marT="34925" marB="34925">
                     <a:lnL w="12700" cap="flat" cmpd="sng" algn="ctr">
                       <a:solidFill>
-                        <a:srgbClr val="000000"/>
+                        <a:srgbClr xmlns:mc="http://schemas.openxmlformats.org/markup-compatibility/2006" xmlns:a14="http://schemas.microsoft.com/office/drawing/2010/main" val="000000" mc:Ignorable=""/>
                       </a:solidFill>
                       <a:prstDash val="solid"/>
                       <a:round/>
@@ -6565,7 +6472,7 @@
                     </a:lnL>
                     <a:lnR w="12700" cap="flat" cmpd="sng" algn="ctr">
                       <a:solidFill>
-                        <a:srgbClr val="000000"/>
+                        <a:srgbClr xmlns:mc="http://schemas.openxmlformats.org/markup-compatibility/2006" xmlns:a14="http://schemas.microsoft.com/office/drawing/2010/main" val="000000" mc:Ignorable=""/>
                       </a:solidFill>
                       <a:prstDash val="solid"/>
                       <a:round/>
@@ -6574,7 +6481,7 @@
                     </a:lnR>
                     <a:lnT w="12700" cap="flat" cmpd="sng" algn="ctr">
                       <a:solidFill>
-                        <a:srgbClr val="000000"/>
+                        <a:srgbClr xmlns:mc="http://schemas.openxmlformats.org/markup-compatibility/2006" xmlns:a14="http://schemas.microsoft.com/office/drawing/2010/main" val="000000" mc:Ignorable=""/>
                       </a:solidFill>
                       <a:prstDash val="solid"/>
                       <a:round/>
@@ -6583,7 +6490,7 @@
                     </a:lnT>
                     <a:lnB w="12700" cap="flat" cmpd="sng" algn="ctr">
                       <a:solidFill>
-                        <a:srgbClr val="000000"/>
+                        <a:srgbClr xmlns:mc="http://schemas.openxmlformats.org/markup-compatibility/2006" xmlns:a14="http://schemas.microsoft.com/office/drawing/2010/main" val="000000" mc:Ignorable=""/>
                       </a:solidFill>
                       <a:prstDash val="solid"/>
                       <a:round/>
@@ -6619,7 +6526,7 @@
                   <a:tcPr marL="34925" marR="34925" marT="34925" marB="34925">
                     <a:lnL w="12700" cap="flat" cmpd="sng" algn="ctr">
                       <a:solidFill>
-                        <a:srgbClr val="000000"/>
+                        <a:srgbClr xmlns:mc="http://schemas.openxmlformats.org/markup-compatibility/2006" xmlns:a14="http://schemas.microsoft.com/office/drawing/2010/main" val="000000" mc:Ignorable=""/>
                       </a:solidFill>
                       <a:prstDash val="solid"/>
                       <a:round/>
@@ -6628,7 +6535,7 @@
                     </a:lnL>
                     <a:lnR w="12700" cap="flat" cmpd="sng" algn="ctr">
                       <a:solidFill>
-                        <a:srgbClr val="000000"/>
+                        <a:srgbClr xmlns:mc="http://schemas.openxmlformats.org/markup-compatibility/2006" xmlns:a14="http://schemas.microsoft.com/office/drawing/2010/main" val="000000" mc:Ignorable=""/>
                       </a:solidFill>
                       <a:prstDash val="solid"/>
                       <a:round/>
@@ -6637,7 +6544,7 @@
                     </a:lnR>
                     <a:lnT w="12700" cap="flat" cmpd="sng" algn="ctr">
                       <a:solidFill>
-                        <a:srgbClr val="000000"/>
+                        <a:srgbClr xmlns:mc="http://schemas.openxmlformats.org/markup-compatibility/2006" xmlns:a14="http://schemas.microsoft.com/office/drawing/2010/main" val="000000" mc:Ignorable=""/>
                       </a:solidFill>
                       <a:prstDash val="solid"/>
                       <a:round/>
@@ -6646,7 +6553,7 @@
                     </a:lnT>
                     <a:lnB w="12700" cap="flat" cmpd="sng" algn="ctr">
                       <a:solidFill>
-                        <a:srgbClr val="000000"/>
+                        <a:srgbClr xmlns:mc="http://schemas.openxmlformats.org/markup-compatibility/2006" xmlns:a14="http://schemas.microsoft.com/office/drawing/2010/main" val="000000" mc:Ignorable=""/>
                       </a:solidFill>
                       <a:prstDash val="solid"/>
                       <a:round/>
@@ -6697,7 +6604,7 @@
                   <a:tcPr marL="34925" marR="34925" marT="34925" marB="34925">
                     <a:lnL w="12700" cap="flat" cmpd="sng" algn="ctr">
                       <a:solidFill>
-                        <a:srgbClr val="000000"/>
+                        <a:srgbClr xmlns:mc="http://schemas.openxmlformats.org/markup-compatibility/2006" xmlns:a14="http://schemas.microsoft.com/office/drawing/2010/main" val="000000" mc:Ignorable=""/>
                       </a:solidFill>
                       <a:prstDash val="solid"/>
                       <a:round/>
@@ -6706,7 +6613,7 @@
                     </a:lnL>
                     <a:lnR w="12700" cap="flat" cmpd="sng" algn="ctr">
                       <a:solidFill>
-                        <a:srgbClr val="000000"/>
+                        <a:srgbClr xmlns:mc="http://schemas.openxmlformats.org/markup-compatibility/2006" xmlns:a14="http://schemas.microsoft.com/office/drawing/2010/main" val="000000" mc:Ignorable=""/>
                       </a:solidFill>
                       <a:prstDash val="solid"/>
                       <a:round/>
@@ -6715,7 +6622,7 @@
                     </a:lnR>
                     <a:lnT w="12700" cap="flat" cmpd="sng" algn="ctr">
                       <a:solidFill>
-                        <a:srgbClr val="000000"/>
+                        <a:srgbClr xmlns:mc="http://schemas.openxmlformats.org/markup-compatibility/2006" xmlns:a14="http://schemas.microsoft.com/office/drawing/2010/main" val="000000" mc:Ignorable=""/>
                       </a:solidFill>
                       <a:prstDash val="solid"/>
                       <a:round/>
@@ -6724,7 +6631,7 @@
                     </a:lnT>
                     <a:lnB w="12700" cap="flat" cmpd="sng" algn="ctr">
                       <a:solidFill>
-                        <a:srgbClr val="000000"/>
+                        <a:srgbClr xmlns:mc="http://schemas.openxmlformats.org/markup-compatibility/2006" xmlns:a14="http://schemas.microsoft.com/office/drawing/2010/main" val="000000" mc:Ignorable=""/>
                       </a:solidFill>
                       <a:prstDash val="solid"/>
                       <a:round/>
@@ -6757,34 +6664,34 @@
         <a:sysClr val="window" lastClr="FFFFFF"/>
       </a:lt1>
       <a:dk2>
-        <a:srgbClr val="323232"/>
+        <a:srgbClr xmlns:mc="http://schemas.openxmlformats.org/markup-compatibility/2006" xmlns:a14="http://schemas.microsoft.com/office/drawing/2010/main" val="323232" mc:Ignorable=""/>
       </a:dk2>
       <a:lt2>
-        <a:srgbClr val="E3DED1"/>
+        <a:srgbClr xmlns:mc="http://schemas.openxmlformats.org/markup-compatibility/2006" xmlns:a14="http://schemas.microsoft.com/office/drawing/2010/main" val="E3DED1" mc:Ignorable=""/>
       </a:lt2>
       <a:accent1>
-        <a:srgbClr val="F07F09"/>
+        <a:srgbClr xmlns:mc="http://schemas.openxmlformats.org/markup-compatibility/2006" xmlns:a14="http://schemas.microsoft.com/office/drawing/2010/main" val="F07F09" mc:Ignorable=""/>
       </a:accent1>
       <a:accent2>
-        <a:srgbClr val="9F2936"/>
+        <a:srgbClr xmlns:mc="http://schemas.openxmlformats.org/markup-compatibility/2006" xmlns:a14="http://schemas.microsoft.com/office/drawing/2010/main" val="9F2936" mc:Ignorable=""/>
       </a:accent2>
       <a:accent3>
-        <a:srgbClr val="1B587C"/>
+        <a:srgbClr xmlns:mc="http://schemas.openxmlformats.org/markup-compatibility/2006" xmlns:a14="http://schemas.microsoft.com/office/drawing/2010/main" val="1B587C" mc:Ignorable=""/>
       </a:accent3>
       <a:accent4>
-        <a:srgbClr val="4E8542"/>
+        <a:srgbClr xmlns:mc="http://schemas.openxmlformats.org/markup-compatibility/2006" xmlns:a14="http://schemas.microsoft.com/office/drawing/2010/main" val="4E8542" mc:Ignorable=""/>
       </a:accent4>
       <a:accent5>
-        <a:srgbClr val="604878"/>
+        <a:srgbClr xmlns:mc="http://schemas.openxmlformats.org/markup-compatibility/2006" xmlns:a14="http://schemas.microsoft.com/office/drawing/2010/main" val="604878" mc:Ignorable=""/>
       </a:accent5>
       <a:accent6>
-        <a:srgbClr val="C19859"/>
+        <a:srgbClr xmlns:mc="http://schemas.openxmlformats.org/markup-compatibility/2006" xmlns:a14="http://schemas.microsoft.com/office/drawing/2010/main" val="C19859" mc:Ignorable=""/>
       </a:accent6>
       <a:hlink>
-        <a:srgbClr val="6B9F25"/>
+        <a:srgbClr xmlns:mc="http://schemas.openxmlformats.org/markup-compatibility/2006" xmlns:a14="http://schemas.microsoft.com/office/drawing/2010/main" val="6B9F25" mc:Ignorable=""/>
       </a:hlink>
       <a:folHlink>
-        <a:srgbClr val="B26B02"/>
+        <a:srgbClr xmlns:mc="http://schemas.openxmlformats.org/markup-compatibility/2006" xmlns:a14="http://schemas.microsoft.com/office/drawing/2010/main" val="B26B02" mc:Ignorable=""/>
       </a:folHlink>
     </a:clrScheme>
     <a:fontScheme name="Aspect">
@@ -6935,7 +6842,7 @@
         <a:effectStyle>
           <a:effectLst>
             <a:outerShdw blurRad="65500" dist="38100" dir="5400000" rotWithShape="0">
-              <a:srgbClr val="000000">
+              <a:srgbClr xmlns:mc="http://schemas.openxmlformats.org/markup-compatibility/2006" xmlns:a14="http://schemas.microsoft.com/office/drawing/2010/main" val="000000" mc:Ignorable="">
                 <a:alpha val="40000"/>
               </a:srgbClr>
             </a:outerShdw>
@@ -6944,7 +6851,7 @@
         <a:effectStyle>
           <a:effectLst>
             <a:outerShdw blurRad="65500" dist="38100" dir="5400000" rotWithShape="0">
-              <a:srgbClr val="000000">
+              <a:srgbClr xmlns:mc="http://schemas.openxmlformats.org/markup-compatibility/2006" xmlns:a14="http://schemas.microsoft.com/office/drawing/2010/main" val="000000" mc:Ignorable="">
                 <a:alpha val="40000"/>
               </a:srgbClr>
             </a:outerShdw>
@@ -6953,7 +6860,7 @@
         <a:effectStyle>
           <a:effectLst>
             <a:outerShdw blurRad="65500" dist="38100" dir="5400000" rotWithShape="0">
-              <a:srgbClr val="000000">
+              <a:srgbClr xmlns:mc="http://schemas.openxmlformats.org/markup-compatibility/2006" xmlns:a14="http://schemas.microsoft.com/office/drawing/2010/main" val="000000" mc:Ignorable="">
                 <a:alpha val="40000"/>
               </a:srgbClr>
             </a:outerShdw>

</xml_diff>